<commit_message>
Added interpretation of hazard ratio to survival lecture 3.
</commit_message>
<xml_diff>
--- a/bin/survival lecture 3.pptx
+++ b/bin/survival lecture 3.pptx
@@ -5,10 +5,10 @@
     <p:sldMasterId id="2147483664" r:id="rId1"/>
   </p:sldMasterIdLst>
   <p:notesMasterIdLst>
-    <p:notesMasterId r:id="rId22"/>
+    <p:notesMasterId r:id="rId37"/>
   </p:notesMasterIdLst>
   <p:handoutMasterIdLst>
-    <p:handoutMasterId r:id="rId23"/>
+    <p:handoutMasterId r:id="rId38"/>
   </p:handoutMasterIdLst>
   <p:sldIdLst>
     <p:sldId id="256" r:id="rId2"/>
@@ -17,20 +17,35 @@
     <p:sldId id="326" r:id="rId5"/>
     <p:sldId id="327" r:id="rId6"/>
     <p:sldId id="328" r:id="rId7"/>
-    <p:sldId id="329" r:id="rId8"/>
-    <p:sldId id="330" r:id="rId9"/>
+    <p:sldId id="330" r:id="rId8"/>
+    <p:sldId id="329" r:id="rId9"/>
     <p:sldId id="294" r:id="rId10"/>
-    <p:sldId id="332" r:id="rId11"/>
-    <p:sldId id="333" r:id="rId12"/>
-    <p:sldId id="334" r:id="rId13"/>
-    <p:sldId id="335" r:id="rId14"/>
-    <p:sldId id="331" r:id="rId15"/>
-    <p:sldId id="337" r:id="rId16"/>
-    <p:sldId id="338" r:id="rId17"/>
-    <p:sldId id="339" r:id="rId18"/>
-    <p:sldId id="340" r:id="rId19"/>
-    <p:sldId id="341" r:id="rId20"/>
-    <p:sldId id="336" r:id="rId21"/>
+    <p:sldId id="357" r:id="rId11"/>
+    <p:sldId id="358" r:id="rId12"/>
+    <p:sldId id="355" r:id="rId13"/>
+    <p:sldId id="332" r:id="rId14"/>
+    <p:sldId id="333" r:id="rId15"/>
+    <p:sldId id="334" r:id="rId16"/>
+    <p:sldId id="335" r:id="rId17"/>
+    <p:sldId id="331" r:id="rId18"/>
+    <p:sldId id="337" r:id="rId19"/>
+    <p:sldId id="338" r:id="rId20"/>
+    <p:sldId id="340" r:id="rId21"/>
+    <p:sldId id="341" r:id="rId22"/>
+    <p:sldId id="336" r:id="rId23"/>
+    <p:sldId id="343" r:id="rId24"/>
+    <p:sldId id="344" r:id="rId25"/>
+    <p:sldId id="345" r:id="rId26"/>
+    <p:sldId id="346" r:id="rId27"/>
+    <p:sldId id="347" r:id="rId28"/>
+    <p:sldId id="348" r:id="rId29"/>
+    <p:sldId id="349" r:id="rId30"/>
+    <p:sldId id="350" r:id="rId31"/>
+    <p:sldId id="354" r:id="rId32"/>
+    <p:sldId id="351" r:id="rId33"/>
+    <p:sldId id="353" r:id="rId34"/>
+    <p:sldId id="352" r:id="rId35"/>
+    <p:sldId id="342" r:id="rId36"/>
   </p:sldIdLst>
   <p:sldSz cx="9144000" cy="6858000" type="screen4x3"/>
   <p:notesSz cx="9601200" cy="7315200"/>
@@ -347,7 +362,7 @@
               <a:pPr>
                 <a:defRPr/>
               </a:pPr>
-              <a:t>5/6/2018</a:t>
+              <a:t>5/7/2018</a:t>
             </a:fld>
             <a:endParaRPr lang="en-US" altLang="en-US"/>
           </a:p>
@@ -655,7 +670,7 @@
               <a:pPr>
                 <a:defRPr/>
               </a:pPr>
-              <a:t>5/6/2018</a:t>
+              <a:t>5/7/2018</a:t>
             </a:fld>
             <a:endParaRPr lang="en-US" altLang="en-US"/>
           </a:p>
@@ -4153,6 +4168,553 @@
           <a:p>
             <a:r>
               <a:rPr lang="en-US" dirty="0"/>
+              <a:t>Ten extra months for the median survival time.</a:t>
+            </a:r>
+          </a:p>
+        </p:txBody>
+      </p:sp>
+      <p:pic>
+        <p:nvPicPr>
+          <p:cNvPr id="9" name="Picture 8">
+            <a:extLst>
+              <a:ext uri="{FF2B5EF4-FFF2-40B4-BE49-F238E27FC236}">
+                <a16:creationId xmlns:a16="http://schemas.microsoft.com/office/drawing/2014/main" id="{5B43A766-8417-443F-A162-910D119CD482}"/>
+              </a:ext>
+            </a:extLst>
+          </p:cNvPr>
+          <p:cNvPicPr>
+            <a:picLocks noChangeAspect="1"/>
+          </p:cNvPicPr>
+          <p:nvPr/>
+        </p:nvPicPr>
+        <p:blipFill>
+          <a:blip r:embed="rId2"/>
+          <a:stretch>
+            <a:fillRect/>
+          </a:stretch>
+        </p:blipFill>
+        <p:spPr>
+          <a:xfrm>
+            <a:off x="462711" y="2359254"/>
+            <a:ext cx="8228571" cy="3657143"/>
+          </a:xfrm>
+          <a:prstGeom prst="rect">
+            <a:avLst/>
+          </a:prstGeom>
+        </p:spPr>
+      </p:pic>
+    </p:spTree>
+    <p:extLst>
+      <p:ext uri="{BB962C8B-B14F-4D97-AF65-F5344CB8AC3E}">
+        <p14:creationId xmlns:p14="http://schemas.microsoft.com/office/powerpoint/2010/main" val="3428993028"/>
+      </p:ext>
+    </p:extLst>
+  </p:cSld>
+  <p:clrMapOvr>
+    <a:masterClrMapping/>
+  </p:clrMapOvr>
+</p:sld>
+</file>
+
+<file path=ppt/slides/slide11.xml><?xml version="1.0" encoding="utf-8"?>
+<p:sld xmlns:a="http://schemas.openxmlformats.org/drawingml/2006/main" xmlns:r="http://schemas.openxmlformats.org/officeDocument/2006/relationships" xmlns:p="http://schemas.openxmlformats.org/presentationml/2006/main">
+  <p:cSld>
+    <p:spTree>
+      <p:nvGrpSpPr>
+        <p:cNvPr id="1" name=""/>
+        <p:cNvGrpSpPr/>
+        <p:nvPr/>
+      </p:nvGrpSpPr>
+      <p:grpSpPr>
+        <a:xfrm>
+          <a:off x="0" y="0"/>
+          <a:ext cx="0" cy="0"/>
+          <a:chOff x="0" y="0"/>
+          <a:chExt cx="0" cy="0"/>
+        </a:xfrm>
+      </p:grpSpPr>
+      <p:sp>
+        <p:nvSpPr>
+          <p:cNvPr id="2" name="Title 1"/>
+          <p:cNvSpPr>
+            <a:spLocks noGrp="1"/>
+          </p:cNvSpPr>
+          <p:nvPr>
+            <p:ph type="title"/>
+          </p:nvPr>
+        </p:nvSpPr>
+        <p:spPr/>
+        <p:txBody>
+          <a:bodyPr/>
+          <a:lstStyle/>
+          <a:p>
+            <a:r>
+              <a:rPr lang="en-US" dirty="0"/>
+              <a:t>Selecting an appropriate sample size</a:t>
+            </a:r>
+          </a:p>
+        </p:txBody>
+      </p:sp>
+      <p:sp>
+        <p:nvSpPr>
+          <p:cNvPr id="4" name="Footer Placeholder 3"/>
+          <p:cNvSpPr>
+            <a:spLocks noGrp="1"/>
+          </p:cNvSpPr>
+          <p:nvPr>
+            <p:ph type="ftr" sz="quarter" idx="10"/>
+          </p:nvPr>
+        </p:nvSpPr>
+        <p:spPr/>
+        <p:txBody>
+          <a:bodyPr/>
+          <a:lstStyle/>
+          <a:p>
+            <a:pPr>
+              <a:defRPr/>
+            </a:pPr>
+            <a:r>
+              <a:rPr lang="en-US" altLang="en-US" dirty="0"/>
+              <a:t>©2018 Steve Simon    http://TheAnalysisFactor.com</a:t>
+            </a:r>
+          </a:p>
+        </p:txBody>
+      </p:sp>
+      <p:sp>
+        <p:nvSpPr>
+          <p:cNvPr id="5" name="Slide Number Placeholder 4"/>
+          <p:cNvSpPr>
+            <a:spLocks noGrp="1"/>
+          </p:cNvSpPr>
+          <p:nvPr>
+            <p:ph type="sldNum" sz="quarter" idx="11"/>
+          </p:nvPr>
+        </p:nvSpPr>
+        <p:spPr/>
+        <p:txBody>
+          <a:bodyPr/>
+          <a:lstStyle/>
+          <a:p>
+            <a:pPr>
+              <a:defRPr/>
+            </a:pPr>
+            <a:endParaRPr lang="en-US"/>
+          </a:p>
+          <a:p>
+            <a:pPr>
+              <a:defRPr/>
+            </a:pPr>
+            <a:fld id="{E9A8CBA3-AA2B-46A6-BFA3-DCEBEAAB3F0A}" type="slidenum">
+              <a:rPr lang="en-US" smtClean="0"/>
+              <a:pPr>
+                <a:defRPr/>
+              </a:pPr>
+              <a:t>11</a:t>
+            </a:fld>
+            <a:endParaRPr lang="en-US"/>
+          </a:p>
+        </p:txBody>
+      </p:sp>
+      <p:sp>
+        <p:nvSpPr>
+          <p:cNvPr id="6" name="Text Placeholder 5"/>
+          <p:cNvSpPr>
+            <a:spLocks noGrp="1"/>
+          </p:cNvSpPr>
+          <p:nvPr>
+            <p:ph type="body" sz="quarter" idx="12"/>
+          </p:nvPr>
+        </p:nvSpPr>
+        <p:spPr/>
+        <p:txBody>
+          <a:bodyPr/>
+          <a:lstStyle/>
+          <a:p>
+            <a:r>
+              <a:rPr lang="en-US" dirty="0"/>
+              <a:t>25% greater chance of surviving to two years.</a:t>
+            </a:r>
+          </a:p>
+        </p:txBody>
+      </p:sp>
+      <p:pic>
+        <p:nvPicPr>
+          <p:cNvPr id="3" name="Picture 2">
+            <a:extLst>
+              <a:ext uri="{FF2B5EF4-FFF2-40B4-BE49-F238E27FC236}">
+                <a16:creationId xmlns:a16="http://schemas.microsoft.com/office/drawing/2014/main" id="{70A7826C-9F04-492E-AA90-0416DF4F9F9C}"/>
+              </a:ext>
+            </a:extLst>
+          </p:cNvPr>
+          <p:cNvPicPr>
+            <a:picLocks noChangeAspect="1"/>
+          </p:cNvPicPr>
+          <p:nvPr/>
+        </p:nvPicPr>
+        <p:blipFill>
+          <a:blip r:embed="rId2"/>
+          <a:stretch>
+            <a:fillRect/>
+          </a:stretch>
+        </p:blipFill>
+        <p:spPr>
+          <a:xfrm>
+            <a:off x="458229" y="2359254"/>
+            <a:ext cx="8228571" cy="3657143"/>
+          </a:xfrm>
+          <a:prstGeom prst="rect">
+            <a:avLst/>
+          </a:prstGeom>
+        </p:spPr>
+      </p:pic>
+    </p:spTree>
+    <p:extLst>
+      <p:ext uri="{BB962C8B-B14F-4D97-AF65-F5344CB8AC3E}">
+        <p14:creationId xmlns:p14="http://schemas.microsoft.com/office/powerpoint/2010/main" val="3858550781"/>
+      </p:ext>
+    </p:extLst>
+  </p:cSld>
+  <p:clrMapOvr>
+    <a:masterClrMapping/>
+  </p:clrMapOvr>
+</p:sld>
+</file>
+
+<file path=ppt/slides/slide12.xml><?xml version="1.0" encoding="utf-8"?>
+<p:sld xmlns:a="http://schemas.openxmlformats.org/drawingml/2006/main" xmlns:r="http://schemas.openxmlformats.org/officeDocument/2006/relationships" xmlns:p="http://schemas.openxmlformats.org/presentationml/2006/main">
+  <p:cSld>
+    <p:spTree>
+      <p:nvGrpSpPr>
+        <p:cNvPr id="1" name=""/>
+        <p:cNvGrpSpPr/>
+        <p:nvPr/>
+      </p:nvGrpSpPr>
+      <p:grpSpPr>
+        <a:xfrm>
+          <a:off x="0" y="0"/>
+          <a:ext cx="0" cy="0"/>
+          <a:chOff x="0" y="0"/>
+          <a:chExt cx="0" cy="0"/>
+        </a:xfrm>
+      </p:grpSpPr>
+      <p:sp>
+        <p:nvSpPr>
+          <p:cNvPr id="2" name="Title 1"/>
+          <p:cNvSpPr>
+            <a:spLocks noGrp="1"/>
+          </p:cNvSpPr>
+          <p:nvPr>
+            <p:ph type="title"/>
+          </p:nvPr>
+        </p:nvSpPr>
+        <p:spPr/>
+        <p:txBody>
+          <a:bodyPr/>
+          <a:lstStyle/>
+          <a:p>
+            <a:r>
+              <a:rPr lang="en-US" dirty="0"/>
+              <a:t>Selecting an appropriate sample size</a:t>
+            </a:r>
+          </a:p>
+        </p:txBody>
+      </p:sp>
+      <p:sp>
+        <p:nvSpPr>
+          <p:cNvPr id="3" name="Text Placeholder 2"/>
+          <p:cNvSpPr>
+            <a:spLocks noGrp="1"/>
+          </p:cNvSpPr>
+          <p:nvPr>
+            <p:ph type="body" idx="1"/>
+          </p:nvPr>
+        </p:nvSpPr>
+        <p:spPr/>
+        <p:txBody>
+          <a:bodyPr/>
+          <a:lstStyle/>
+          <a:p>
+            <a:r>
+              <a:rPr lang="en-US" dirty="0">
+                <a:latin typeface="+mj-lt"/>
+                <a:cs typeface="Courier New" panose="02070309020205020404" pitchFamily="49" charset="0"/>
+              </a:rPr>
+              <a:t>Many researchers consider a formula for sample size to be inadequate. The reasons include</a:t>
+            </a:r>
+          </a:p>
+          <a:p>
+            <a:endParaRPr lang="en-US" dirty="0">
+              <a:latin typeface="+mj-lt"/>
+              <a:cs typeface="Courier New" panose="02070309020205020404" pitchFamily="49" charset="0"/>
+            </a:endParaRPr>
+          </a:p>
+          <a:p>
+            <a:pPr marL="457200" indent="-457200">
+              <a:buFont typeface="+mj-lt"/>
+              <a:buAutoNum type="arabicPeriod"/>
+            </a:pPr>
+            <a:r>
+              <a:rPr lang="en-US" dirty="0">
+                <a:latin typeface="+mj-lt"/>
+                <a:cs typeface="Courier New" panose="02070309020205020404" pitchFamily="49" charset="0"/>
+              </a:rPr>
+              <a:t>The simplistic adjustments for censoring and dropouts.</a:t>
+            </a:r>
+          </a:p>
+          <a:p>
+            <a:pPr marL="457200" indent="-457200">
+              <a:buFont typeface="+mj-lt"/>
+              <a:buAutoNum type="arabicPeriod"/>
+            </a:pPr>
+            <a:r>
+              <a:rPr lang="en-US" dirty="0">
+                <a:latin typeface="+mj-lt"/>
+                <a:cs typeface="Courier New" panose="02070309020205020404" pitchFamily="49" charset="0"/>
+              </a:rPr>
+              <a:t>The tendency for the sample size and power formulas to become unwieldy for even minor complications.</a:t>
+            </a:r>
+          </a:p>
+          <a:p>
+            <a:pPr marL="457200" indent="-457200">
+              <a:buFont typeface="+mj-lt"/>
+              <a:buAutoNum type="arabicPeriod"/>
+            </a:pPr>
+            <a:r>
+              <a:rPr lang="en-US" dirty="0">
+                <a:latin typeface="+mj-lt"/>
+                <a:cs typeface="Courier New" panose="02070309020205020404" pitchFamily="49" charset="0"/>
+              </a:rPr>
+              <a:t>The inability to examine the sensitivity of your assumptions.</a:t>
+            </a:r>
+          </a:p>
+          <a:p>
+            <a:endParaRPr lang="en-US" dirty="0">
+              <a:latin typeface="+mj-lt"/>
+              <a:cs typeface="Courier New" panose="02070309020205020404" pitchFamily="49" charset="0"/>
+            </a:endParaRPr>
+          </a:p>
+          <a:p>
+            <a:r>
+              <a:rPr lang="en-US" dirty="0">
+                <a:latin typeface="+mj-lt"/>
+                <a:cs typeface="Courier New" panose="02070309020205020404" pitchFamily="49" charset="0"/>
+              </a:rPr>
+              <a:t>Simulation of power is fairly easy and very flexible.</a:t>
+            </a:r>
+          </a:p>
+        </p:txBody>
+      </p:sp>
+      <p:sp>
+        <p:nvSpPr>
+          <p:cNvPr id="4" name="Footer Placeholder 3"/>
+          <p:cNvSpPr>
+            <a:spLocks noGrp="1"/>
+          </p:cNvSpPr>
+          <p:nvPr>
+            <p:ph type="ftr" sz="quarter" idx="10"/>
+          </p:nvPr>
+        </p:nvSpPr>
+        <p:spPr/>
+        <p:txBody>
+          <a:bodyPr/>
+          <a:lstStyle/>
+          <a:p>
+            <a:pPr>
+              <a:defRPr/>
+            </a:pPr>
+            <a:r>
+              <a:rPr lang="en-US" altLang="en-US" dirty="0"/>
+              <a:t>©2018 Steve Simon    http://TheAnalysisFactor.com</a:t>
+            </a:r>
+          </a:p>
+        </p:txBody>
+      </p:sp>
+      <p:sp>
+        <p:nvSpPr>
+          <p:cNvPr id="5" name="Slide Number Placeholder 4"/>
+          <p:cNvSpPr>
+            <a:spLocks noGrp="1"/>
+          </p:cNvSpPr>
+          <p:nvPr>
+            <p:ph type="sldNum" sz="quarter" idx="11"/>
+          </p:nvPr>
+        </p:nvSpPr>
+        <p:spPr/>
+        <p:txBody>
+          <a:bodyPr/>
+          <a:lstStyle/>
+          <a:p>
+            <a:pPr>
+              <a:defRPr/>
+            </a:pPr>
+            <a:endParaRPr lang="en-US"/>
+          </a:p>
+          <a:p>
+            <a:pPr>
+              <a:defRPr/>
+            </a:pPr>
+            <a:fld id="{E9A8CBA3-AA2B-46A6-BFA3-DCEBEAAB3F0A}" type="slidenum">
+              <a:rPr lang="en-US" smtClean="0"/>
+              <a:pPr>
+                <a:defRPr/>
+              </a:pPr>
+              <a:t>12</a:t>
+            </a:fld>
+            <a:endParaRPr lang="en-US"/>
+          </a:p>
+        </p:txBody>
+      </p:sp>
+      <p:sp>
+        <p:nvSpPr>
+          <p:cNvPr id="6" name="Text Placeholder 5"/>
+          <p:cNvSpPr>
+            <a:spLocks noGrp="1"/>
+          </p:cNvSpPr>
+          <p:nvPr>
+            <p:ph type="body" sz="quarter" idx="12"/>
+          </p:nvPr>
+        </p:nvSpPr>
+        <p:spPr/>
+        <p:txBody>
+          <a:bodyPr/>
+          <a:lstStyle/>
+          <a:p>
+            <a:r>
+              <a:rPr lang="en-US" dirty="0"/>
+              <a:t>Simulation of power</a:t>
+            </a:r>
+          </a:p>
+        </p:txBody>
+      </p:sp>
+    </p:spTree>
+    <p:extLst>
+      <p:ext uri="{BB962C8B-B14F-4D97-AF65-F5344CB8AC3E}">
+        <p14:creationId xmlns:p14="http://schemas.microsoft.com/office/powerpoint/2010/main" val="272152327"/>
+      </p:ext>
+    </p:extLst>
+  </p:cSld>
+  <p:clrMapOvr>
+    <a:masterClrMapping/>
+  </p:clrMapOvr>
+</p:sld>
+</file>
+
+<file path=ppt/slides/slide13.xml><?xml version="1.0" encoding="utf-8"?>
+<p:sld xmlns:a="http://schemas.openxmlformats.org/drawingml/2006/main" xmlns:r="http://schemas.openxmlformats.org/officeDocument/2006/relationships" xmlns:p="http://schemas.openxmlformats.org/presentationml/2006/main">
+  <p:cSld>
+    <p:spTree>
+      <p:nvGrpSpPr>
+        <p:cNvPr id="1" name=""/>
+        <p:cNvGrpSpPr/>
+        <p:nvPr/>
+      </p:nvGrpSpPr>
+      <p:grpSpPr>
+        <a:xfrm>
+          <a:off x="0" y="0"/>
+          <a:ext cx="0" cy="0"/>
+          <a:chOff x="0" y="0"/>
+          <a:chExt cx="0" cy="0"/>
+        </a:xfrm>
+      </p:grpSpPr>
+      <p:sp>
+        <p:nvSpPr>
+          <p:cNvPr id="2" name="Title 1"/>
+          <p:cNvSpPr>
+            <a:spLocks noGrp="1"/>
+          </p:cNvSpPr>
+          <p:nvPr>
+            <p:ph type="title"/>
+          </p:nvPr>
+        </p:nvSpPr>
+        <p:spPr/>
+        <p:txBody>
+          <a:bodyPr/>
+          <a:lstStyle/>
+          <a:p>
+            <a:r>
+              <a:rPr lang="en-US" dirty="0"/>
+              <a:t>Selecting an appropriate sample size</a:t>
+            </a:r>
+          </a:p>
+        </p:txBody>
+      </p:sp>
+      <p:sp>
+        <p:nvSpPr>
+          <p:cNvPr id="4" name="Footer Placeholder 3"/>
+          <p:cNvSpPr>
+            <a:spLocks noGrp="1"/>
+          </p:cNvSpPr>
+          <p:nvPr>
+            <p:ph type="ftr" sz="quarter" idx="10"/>
+          </p:nvPr>
+        </p:nvSpPr>
+        <p:spPr/>
+        <p:txBody>
+          <a:bodyPr/>
+          <a:lstStyle/>
+          <a:p>
+            <a:pPr>
+              <a:defRPr/>
+            </a:pPr>
+            <a:r>
+              <a:rPr lang="en-US" altLang="en-US" dirty="0"/>
+              <a:t>©2018 Steve Simon    http://TheAnalysisFactor.com</a:t>
+            </a:r>
+          </a:p>
+        </p:txBody>
+      </p:sp>
+      <p:sp>
+        <p:nvSpPr>
+          <p:cNvPr id="5" name="Slide Number Placeholder 4"/>
+          <p:cNvSpPr>
+            <a:spLocks noGrp="1"/>
+          </p:cNvSpPr>
+          <p:nvPr>
+            <p:ph type="sldNum" sz="quarter" idx="11"/>
+          </p:nvPr>
+        </p:nvSpPr>
+        <p:spPr/>
+        <p:txBody>
+          <a:bodyPr/>
+          <a:lstStyle/>
+          <a:p>
+            <a:pPr>
+              <a:defRPr/>
+            </a:pPr>
+            <a:endParaRPr lang="en-US"/>
+          </a:p>
+          <a:p>
+            <a:pPr>
+              <a:defRPr/>
+            </a:pPr>
+            <a:fld id="{E9A8CBA3-AA2B-46A6-BFA3-DCEBEAAB3F0A}" type="slidenum">
+              <a:rPr lang="en-US" smtClean="0"/>
+              <a:pPr>
+                <a:defRPr/>
+              </a:pPr>
+              <a:t>13</a:t>
+            </a:fld>
+            <a:endParaRPr lang="en-US"/>
+          </a:p>
+        </p:txBody>
+      </p:sp>
+      <p:sp>
+        <p:nvSpPr>
+          <p:cNvPr id="6" name="Text Placeholder 5"/>
+          <p:cNvSpPr>
+            <a:spLocks noGrp="1"/>
+          </p:cNvSpPr>
+          <p:nvPr>
+            <p:ph type="body" sz="quarter" idx="12"/>
+          </p:nvPr>
+        </p:nvSpPr>
+        <p:spPr/>
+        <p:txBody>
+          <a:bodyPr/>
+          <a:lstStyle/>
+          <a:p>
+            <a:r>
+              <a:rPr lang="en-US" dirty="0"/>
               <a:t>Generate random starting times</a:t>
             </a:r>
           </a:p>
@@ -4201,7 +4763,7 @@
 </p:sld>
 </file>
 
-<file path=ppt/slides/slide11.xml><?xml version="1.0" encoding="utf-8"?>
+<file path=ppt/slides/slide14.xml><?xml version="1.0" encoding="utf-8"?>
 <p:sld xmlns:a="http://schemas.openxmlformats.org/drawingml/2006/main" xmlns:r="http://schemas.openxmlformats.org/officeDocument/2006/relationships" xmlns:p="http://schemas.openxmlformats.org/presentationml/2006/main">
   <p:cSld>
     <p:spTree>
@@ -4294,7 +4856,7 @@
               <a:pPr>
                 <a:defRPr/>
               </a:pPr>
-              <a:t>11</a:t>
+              <a:t>14</a:t>
             </a:fld>
             <a:endParaRPr lang="en-US"/>
           </a:p>
@@ -4365,7 +4927,7 @@
 </p:sld>
 </file>
 
-<file path=ppt/slides/slide12.xml><?xml version="1.0" encoding="utf-8"?>
+<file path=ppt/slides/slide15.xml><?xml version="1.0" encoding="utf-8"?>
 <p:sld xmlns:a="http://schemas.openxmlformats.org/drawingml/2006/main" xmlns:r="http://schemas.openxmlformats.org/officeDocument/2006/relationships" xmlns:p="http://schemas.openxmlformats.org/presentationml/2006/main">
   <p:cSld>
     <p:spTree>
@@ -4458,7 +5020,7 @@
               <a:pPr>
                 <a:defRPr/>
               </a:pPr>
-              <a:t>12</a:t>
+              <a:t>15</a:t>
             </a:fld>
             <a:endParaRPr lang="en-US"/>
           </a:p>
@@ -4529,7 +5091,7 @@
 </p:sld>
 </file>
 
-<file path=ppt/slides/slide13.xml><?xml version="1.0" encoding="utf-8"?>
+<file path=ppt/slides/slide16.xml><?xml version="1.0" encoding="utf-8"?>
 <p:sld xmlns:a="http://schemas.openxmlformats.org/drawingml/2006/main" xmlns:r="http://schemas.openxmlformats.org/officeDocument/2006/relationships" xmlns:p="http://schemas.openxmlformats.org/presentationml/2006/main">
   <p:cSld>
     <p:spTree>
@@ -4622,7 +5184,7 @@
               <a:pPr>
                 <a:defRPr/>
               </a:pPr>
-              <a:t>13</a:t>
+              <a:t>16</a:t>
             </a:fld>
             <a:endParaRPr lang="en-US"/>
           </a:p>
@@ -4693,7 +5255,7 @@
 </p:sld>
 </file>
 
-<file path=ppt/slides/slide14.xml><?xml version="1.0" encoding="utf-8"?>
+<file path=ppt/slides/slide17.xml><?xml version="1.0" encoding="utf-8"?>
 <p:sld xmlns:a="http://schemas.openxmlformats.org/drawingml/2006/main" xmlns:r="http://schemas.openxmlformats.org/officeDocument/2006/relationships" xmlns:p="http://schemas.openxmlformats.org/presentationml/2006/main">
   <p:cSld>
     <p:spTree>
@@ -4829,7 +5391,7 @@
               <a:pPr>
                 <a:defRPr/>
               </a:pPr>
-              <a:t>14</a:t>
+              <a:t>17</a:t>
             </a:fld>
             <a:endParaRPr lang="en-US"/>
           </a:p>
@@ -4870,7 +5432,7 @@
 </p:sld>
 </file>
 
-<file path=ppt/slides/slide15.xml><?xml version="1.0" encoding="utf-8"?>
+<file path=ppt/slides/slide18.xml><?xml version="1.0" encoding="utf-8"?>
 <p:sld xmlns:a="http://schemas.openxmlformats.org/drawingml/2006/main" xmlns:r="http://schemas.openxmlformats.org/officeDocument/2006/relationships" xmlns:p="http://schemas.openxmlformats.org/presentationml/2006/main">
   <p:cSld>
     <p:spTree>
@@ -4916,7 +5478,7 @@
               <a:pPr>
                 <a:defRPr/>
               </a:pPr>
-              <a:t>15</a:t>
+              <a:t>18</a:t>
             </a:fld>
             <a:endParaRPr lang="en-US"/>
           </a:p>
@@ -4971,7 +5533,7 @@
 </p:sld>
 </file>
 
-<file path=ppt/slides/slide16.xml><?xml version="1.0" encoding="utf-8"?>
+<file path=ppt/slides/slide19.xml><?xml version="1.0" encoding="utf-8"?>
 <p:sld xmlns:a="http://schemas.openxmlformats.org/drawingml/2006/main" xmlns:r="http://schemas.openxmlformats.org/officeDocument/2006/relationships" xmlns:p="http://schemas.openxmlformats.org/presentationml/2006/main">
   <p:cSld>
     <p:spTree>
@@ -5168,7 +5730,7 @@
               <a:pPr>
                 <a:defRPr/>
               </a:pPr>
-              <a:t>16</a:t>
+              <a:t>19</a:t>
             </a:fld>
             <a:endParaRPr lang="en-US"/>
           </a:p>
@@ -5209,7 +5771,7 @@
 </p:sld>
 </file>
 
-<file path=ppt/slides/slide17.xml><?xml version="1.0" encoding="utf-8"?>
+<file path=ppt/slides/slide2.xml><?xml version="1.0" encoding="utf-8"?>
 <p:sld xmlns:a="http://schemas.openxmlformats.org/drawingml/2006/main" xmlns:r="http://schemas.openxmlformats.org/officeDocument/2006/relationships" xmlns:p="http://schemas.openxmlformats.org/presentationml/2006/main">
   <p:cSld>
     <p:spTree>
@@ -5243,7 +5805,7 @@
           <a:p>
             <a:r>
               <a:rPr lang="en-US" dirty="0"/>
-              <a:t>Data management</a:t>
+              <a:t>Abstract</a:t>
             </a:r>
           </a:p>
         </p:txBody>
@@ -5264,90 +5826,8 @@
           <a:lstStyle/>
           <a:p>
             <a:r>
-              <a:rPr lang="en-US" dirty="0">
-                <a:latin typeface="+mj-lt"/>
-                <a:cs typeface="Courier New" panose="02070309020205020404" pitchFamily="49" charset="0"/>
-              </a:rPr>
-              <a:t>Every software program stores dates a little bit differently. R stores dates as internally as the number of days since January 1, 1970.</a:t>
-            </a:r>
-          </a:p>
-          <a:p>
-            <a:endParaRPr lang="en-US" dirty="0">
-              <a:latin typeface="+mj-lt"/>
-              <a:cs typeface="Courier New" panose="02070309020205020404" pitchFamily="49" charset="0"/>
-            </a:endParaRPr>
-          </a:p>
-          <a:p>
-            <a:r>
-              <a:rPr lang="en-US" dirty="0">
-                <a:latin typeface="Courier New" panose="02070309020205020404" pitchFamily="49" charset="0"/>
-                <a:cs typeface="Courier New" panose="02070309020205020404" pitchFamily="49" charset="0"/>
-              </a:rPr>
-              <a:t>baseline &lt;- </a:t>
-            </a:r>
-            <a:r>
-              <a:rPr lang="en-US" dirty="0" err="1">
-                <a:latin typeface="Courier New" panose="02070309020205020404" pitchFamily="49" charset="0"/>
-                <a:cs typeface="Courier New" panose="02070309020205020404" pitchFamily="49" charset="0"/>
-              </a:rPr>
-              <a:t>as.Date</a:t>
-            </a:r>
-            <a:r>
-              <a:rPr lang="en-US" dirty="0">
-                <a:latin typeface="Courier New" panose="02070309020205020404" pitchFamily="49" charset="0"/>
-                <a:cs typeface="Courier New" panose="02070309020205020404" pitchFamily="49" charset="0"/>
-              </a:rPr>
-              <a:t>("1/1/1970", format="%m/%d/%Y")</a:t>
-            </a:r>
-          </a:p>
-          <a:p>
-            <a:r>
-              <a:rPr lang="en-US" dirty="0">
-                <a:latin typeface="Courier New" panose="02070309020205020404" pitchFamily="49" charset="0"/>
-                <a:cs typeface="Courier New" panose="02070309020205020404" pitchFamily="49" charset="0"/>
-              </a:rPr>
-              <a:t>print(baseline)</a:t>
-            </a:r>
-          </a:p>
-          <a:p>
-            <a:r>
-              <a:rPr lang="en-US" dirty="0">
-                <a:latin typeface="Courier New" panose="02070309020205020404" pitchFamily="49" charset="0"/>
-                <a:cs typeface="Courier New" panose="02070309020205020404" pitchFamily="49" charset="0"/>
-              </a:rPr>
-              <a:t>## [1] "1970-01-01"</a:t>
-            </a:r>
-          </a:p>
-          <a:p>
-            <a:r>
-              <a:rPr lang="en-US" dirty="0">
-                <a:latin typeface="Courier New" panose="02070309020205020404" pitchFamily="49" charset="0"/>
-                <a:cs typeface="Courier New" panose="02070309020205020404" pitchFamily="49" charset="0"/>
-              </a:rPr>
-              <a:t>print(</a:t>
-            </a:r>
-            <a:r>
-              <a:rPr lang="en-US" dirty="0" err="1">
-                <a:latin typeface="Courier New" panose="02070309020205020404" pitchFamily="49" charset="0"/>
-                <a:cs typeface="Courier New" panose="02070309020205020404" pitchFamily="49" charset="0"/>
-              </a:rPr>
-              <a:t>as.numeric</a:t>
-            </a:r>
-            <a:r>
-              <a:rPr lang="en-US" dirty="0">
-                <a:latin typeface="Courier New" panose="02070309020205020404" pitchFamily="49" charset="0"/>
-                <a:cs typeface="Courier New" panose="02070309020205020404" pitchFamily="49" charset="0"/>
-              </a:rPr>
-              <a:t>(baseline))</a:t>
-            </a:r>
-          </a:p>
-          <a:p>
-            <a:r>
-              <a:rPr lang="en-US" dirty="0">
-                <a:latin typeface="Courier New" panose="02070309020205020404" pitchFamily="49" charset="0"/>
-                <a:cs typeface="Courier New" panose="02070309020205020404" pitchFamily="49" charset="0"/>
-              </a:rPr>
-              <a:t>## [1] 0</a:t>
+              <a:rPr lang="en-US" dirty="0"/>
+              <a:t>Planning and data management issues for survival data. Planning a study with a survival outcome requires you to specify both the number of patients and the duration of follow-up time. You’ll compute power for hypothetical studies and compare power across different research designs. Then you’ll review the data management needs of a survival study, with a special emphasis on the problems associated with date variables.</a:t>
             </a:r>
           </a:p>
         </p:txBody>
@@ -5406,7 +5886,7 @@
               <a:pPr>
                 <a:defRPr/>
               </a:pPr>
-              <a:t>17</a:t>
+              <a:t>2</a:t>
             </a:fld>
             <a:endParaRPr lang="en-US"/>
           </a:p>
@@ -5429,7 +5909,7 @@
           <a:p>
             <a:r>
               <a:rPr lang="en-US" dirty="0"/>
-              <a:t>Internal storage of dates.</a:t>
+              <a:t>Lecture 3.</a:t>
             </a:r>
           </a:p>
         </p:txBody>
@@ -5437,7 +5917,7 @@
     </p:spTree>
     <p:extLst>
       <p:ext uri="{BB962C8B-B14F-4D97-AF65-F5344CB8AC3E}">
-        <p14:creationId xmlns:p14="http://schemas.microsoft.com/office/powerpoint/2010/main" val="1965123628"/>
+        <p14:creationId xmlns:p14="http://schemas.microsoft.com/office/powerpoint/2010/main" val="3091858404"/>
       </p:ext>
     </p:extLst>
   </p:cSld>
@@ -5447,7 +5927,7 @@
 </p:sld>
 </file>
 
-<file path=ppt/slides/slide18.xml><?xml version="1.0" encoding="utf-8"?>
+<file path=ppt/slides/slide20.xml><?xml version="1.0" encoding="utf-8"?>
 <p:sld xmlns:a="http://schemas.openxmlformats.org/drawingml/2006/main" xmlns:r="http://schemas.openxmlformats.org/officeDocument/2006/relationships" xmlns:p="http://schemas.openxmlformats.org/presentationml/2006/main">
   <p:cSld>
     <p:spTree>
@@ -5518,7 +5998,7 @@
               <a:pPr>
                 <a:defRPr/>
               </a:pPr>
-              <a:t>18</a:t>
+              <a:t>20</a:t>
             </a:fld>
             <a:endParaRPr lang="en-US"/>
           </a:p>
@@ -5597,7 +6077,7 @@
 </p:sld>
 </file>
 
-<file path=ppt/slides/slide19.xml><?xml version="1.0" encoding="utf-8"?>
+<file path=ppt/slides/slide21.xml><?xml version="1.0" encoding="utf-8"?>
 <p:sld xmlns:a="http://schemas.openxmlformats.org/drawingml/2006/main" xmlns:r="http://schemas.openxmlformats.org/officeDocument/2006/relationships" xmlns:p="http://schemas.openxmlformats.org/presentationml/2006/main">
   <p:cSld>
     <p:spTree>
@@ -5643,7 +6123,7 @@
               <a:pPr>
                 <a:defRPr/>
               </a:pPr>
-              <a:t>19</a:t>
+              <a:t>21</a:t>
             </a:fld>
             <a:endParaRPr lang="en-US"/>
           </a:p>
@@ -5692,7 +6172,7 @@
 </p:sld>
 </file>
 
-<file path=ppt/slides/slide2.xml><?xml version="1.0" encoding="utf-8"?>
+<file path=ppt/slides/slide22.xml><?xml version="1.0" encoding="utf-8"?>
 <p:sld xmlns:a="http://schemas.openxmlformats.org/drawingml/2006/main" xmlns:r="http://schemas.openxmlformats.org/officeDocument/2006/relationships" xmlns:p="http://schemas.openxmlformats.org/presentationml/2006/main">
   <p:cSld>
     <p:spTree>
@@ -5726,7 +6206,7 @@
           <a:p>
             <a:r>
               <a:rPr lang="en-US" dirty="0"/>
-              <a:t>Abstract</a:t>
+              <a:t>Data management</a:t>
             </a:r>
           </a:p>
         </p:txBody>
@@ -5747,9 +6227,67 @@
           <a:lstStyle/>
           <a:p>
             <a:r>
-              <a:rPr lang="en-US" dirty="0"/>
-              <a:t>Lecture 3. Planning and data management issues for survival data. Planning a study with a survival outcome requires you to specify both the number of patients and the duration of follow-up time. You’ll compute power for hypothetical studies and compare power across different research designs. Then you’ll review the data management needs of a survival study, with a special emphasis on the problems associated with date variables.</a:t>
-            </a:r>
+              <a:rPr lang="en-US" dirty="0">
+                <a:latin typeface="+mj-lt"/>
+                <a:cs typeface="Courier New" panose="02070309020205020404" pitchFamily="49" charset="0"/>
+              </a:rPr>
+              <a:t>Every software package is different, but in general when you import dates from another program, you will get</a:t>
+            </a:r>
+          </a:p>
+          <a:p>
+            <a:pPr marL="457200" indent="-457200">
+              <a:buFont typeface="+mj-lt"/>
+              <a:buAutoNum type="arabicPeriod"/>
+            </a:pPr>
+            <a:r>
+              <a:rPr lang="en-US" dirty="0">
+                <a:latin typeface="+mj-lt"/>
+                <a:cs typeface="Courier New" panose="02070309020205020404" pitchFamily="49" charset="0"/>
+              </a:rPr>
+              <a:t>a date stored in the correct internal format.</a:t>
+            </a:r>
+          </a:p>
+          <a:p>
+            <a:pPr marL="457200" indent="-457200">
+              <a:buFont typeface="+mj-lt"/>
+              <a:buAutoNum type="arabicPeriod"/>
+            </a:pPr>
+            <a:r>
+              <a:rPr lang="en-US" dirty="0">
+                <a:latin typeface="+mj-lt"/>
+                <a:cs typeface="Courier New" panose="02070309020205020404" pitchFamily="49" charset="0"/>
+              </a:rPr>
+              <a:t>a date stored in incorrectly.</a:t>
+            </a:r>
+          </a:p>
+          <a:p>
+            <a:pPr marL="457200" indent="-457200">
+              <a:buFont typeface="+mj-lt"/>
+              <a:buAutoNum type="arabicPeriod"/>
+            </a:pPr>
+            <a:r>
+              <a:rPr lang="en-US" dirty="0">
+                <a:latin typeface="+mj-lt"/>
+                <a:cs typeface="Courier New" panose="02070309020205020404" pitchFamily="49" charset="0"/>
+              </a:rPr>
+              <a:t>a string that looks like a date but cannot be used in calculating time intervals.</a:t>
+            </a:r>
+          </a:p>
+          <a:p>
+            <a:pPr marL="457200" indent="-457200">
+              <a:buFont typeface="+mj-lt"/>
+              <a:buAutoNum type="arabicPeriod"/>
+            </a:pPr>
+            <a:r>
+              <a:rPr lang="en-US" dirty="0">
+                <a:latin typeface="+mj-lt"/>
+                <a:cs typeface="Courier New" panose="02070309020205020404" pitchFamily="49" charset="0"/>
+              </a:rPr>
+              <a:t>a number related to the internal storage format of the system you are importing from.</a:t>
+            </a:r>
+            <a:endParaRPr lang="en-US" dirty="0">
+              <a:latin typeface="+mj-lt"/>
+            </a:endParaRPr>
           </a:p>
         </p:txBody>
       </p:sp>
@@ -5807,7 +6345,7 @@
               <a:pPr>
                 <a:defRPr/>
               </a:pPr>
-              <a:t>2</a:t>
+              <a:t>22</a:t>
             </a:fld>
             <a:endParaRPr lang="en-US"/>
           </a:p>
@@ -5828,14 +6366,17 @@
           <a:bodyPr/>
           <a:lstStyle/>
           <a:p>
-            <a:endParaRPr lang="en-US"/>
+            <a:r>
+              <a:rPr lang="en-US" dirty="0"/>
+              <a:t>Importing dates</a:t>
+            </a:r>
           </a:p>
         </p:txBody>
       </p:sp>
     </p:spTree>
     <p:extLst>
       <p:ext uri="{BB962C8B-B14F-4D97-AF65-F5344CB8AC3E}">
-        <p14:creationId xmlns:p14="http://schemas.microsoft.com/office/powerpoint/2010/main" val="3091858404"/>
+        <p14:creationId xmlns:p14="http://schemas.microsoft.com/office/powerpoint/2010/main" val="2855152681"/>
       </p:ext>
     </p:extLst>
   </p:cSld>
@@ -5845,7 +6386,7 @@
 </p:sld>
 </file>
 
-<file path=ppt/slides/slide20.xml><?xml version="1.0" encoding="utf-8"?>
+<file path=ppt/slides/slide23.xml><?xml version="1.0" encoding="utf-8"?>
 <p:sld xmlns:a="http://schemas.openxmlformats.org/drawingml/2006/main" xmlns:r="http://schemas.openxmlformats.org/officeDocument/2006/relationships" xmlns:p="http://schemas.openxmlformats.org/presentationml/2006/main">
   <p:cSld>
     <p:spTree>
@@ -5879,7 +6420,7 @@
           <a:p>
             <a:r>
               <a:rPr lang="en-US" dirty="0"/>
-              <a:t>Conclusion</a:t>
+              <a:t>Data management</a:t>
             </a:r>
           </a:p>
         </p:txBody>
@@ -5899,16 +6440,12 @@
           <a:bodyPr/>
           <a:lstStyle/>
           <a:p>
-            <a:pPr marL="457200" indent="-457200">
-              <a:buFont typeface="+mj-lt"/>
-              <a:buAutoNum type="arabicPeriod"/>
-            </a:pPr>
             <a:r>
               <a:rPr lang="en-US" dirty="0">
                 <a:latin typeface="+mj-lt"/>
                 <a:cs typeface="Courier New" panose="02070309020205020404" pitchFamily="49" charset="0"/>
               </a:rPr>
-              <a:t>The hazard function is the short term death rate among those patients surviving to a specific time.</a:t>
+              <a:t>If you are entering the data yourself, </a:t>
             </a:r>
           </a:p>
           <a:p>
@@ -5921,7 +6458,7 @@
                 <a:latin typeface="+mj-lt"/>
                 <a:cs typeface="Courier New" panose="02070309020205020404" pitchFamily="49" charset="0"/>
               </a:rPr>
-              <a:t>The log rank test is a simple test for comparing two or more Kaplan-Meier curves.</a:t>
+              <a:t>always specify year with four digits, and </a:t>
             </a:r>
           </a:p>
           <a:p>
@@ -5934,20 +6471,94 @@
                 <a:latin typeface="+mj-lt"/>
                 <a:cs typeface="Courier New" panose="02070309020205020404" pitchFamily="49" charset="0"/>
               </a:rPr>
-              <a:t>The Cox regression model allows for continuous predictors and risk adjustment. </a:t>
-            </a:r>
-          </a:p>
-          <a:p>
-            <a:pPr marL="457200" indent="-457200">
+              <a:t>use a consistent pre-defined format.</a:t>
+            </a:r>
+          </a:p>
+          <a:p>
+            <a:pPr marL="914400" lvl="1" indent="-457200">
               <a:buFont typeface="+mj-lt"/>
               <a:buAutoNum type="arabicPeriod"/>
             </a:pPr>
+            <a:endParaRPr lang="en-US" dirty="0">
+              <a:latin typeface="+mj-lt"/>
+              <a:cs typeface="Courier New" panose="02070309020205020404" pitchFamily="49" charset="0"/>
+            </a:endParaRPr>
+          </a:p>
+          <a:p>
             <a:r>
               <a:rPr lang="en-US" dirty="0">
                 <a:latin typeface="+mj-lt"/>
                 <a:cs typeface="Courier New" panose="02070309020205020404" pitchFamily="49" charset="0"/>
               </a:rPr>
-              <a:t>The Cox model assumes proportional hazard functions and compares groups using a hazard ratio.</a:t>
+              <a:t>ISO 8601 format (</a:t>
+            </a:r>
+            <a:r>
+              <a:rPr lang="en-US" dirty="0" err="1">
+                <a:latin typeface="+mj-lt"/>
+                <a:cs typeface="Courier New" panose="02070309020205020404" pitchFamily="49" charset="0"/>
+              </a:rPr>
+              <a:t>yyyy</a:t>
+            </a:r>
+            <a:r>
+              <a:rPr lang="en-US" dirty="0">
+                <a:latin typeface="+mj-lt"/>
+                <a:cs typeface="Courier New" panose="02070309020205020404" pitchFamily="49" charset="0"/>
+              </a:rPr>
+              <a:t>-mm-dd) is best for two reasons</a:t>
+            </a:r>
+          </a:p>
+          <a:p>
+            <a:pPr marL="457200" indent="-457200">
+              <a:buFont typeface="+mj-lt"/>
+              <a:buAutoNum type="arabicPeriod"/>
+            </a:pPr>
+            <a:r>
+              <a:rPr lang="en-US" dirty="0">
+                <a:latin typeface="+mj-lt"/>
+                <a:cs typeface="Courier New" panose="02070309020205020404" pitchFamily="49" charset="0"/>
+              </a:rPr>
+              <a:t>It sorts well, even if stored as a string.</a:t>
+            </a:r>
+          </a:p>
+          <a:p>
+            <a:pPr marL="457200" indent="-457200">
+              <a:buFont typeface="+mj-lt"/>
+              <a:buAutoNum type="arabicPeriod"/>
+            </a:pPr>
+            <a:r>
+              <a:rPr lang="en-US" dirty="0">
+                <a:latin typeface="+mj-lt"/>
+                <a:cs typeface="Courier New" panose="02070309020205020404" pitchFamily="49" charset="0"/>
+              </a:rPr>
+              <a:t>It is different from both the informal American (mm-dd-</a:t>
+            </a:r>
+            <a:r>
+              <a:rPr lang="en-US" dirty="0" err="1">
+                <a:latin typeface="+mj-lt"/>
+                <a:cs typeface="Courier New" panose="02070309020205020404" pitchFamily="49" charset="0"/>
+              </a:rPr>
+              <a:t>yyyy</a:t>
+            </a:r>
+            <a:r>
+              <a:rPr lang="en-US" dirty="0">
+                <a:latin typeface="+mj-lt"/>
+                <a:cs typeface="Courier New" panose="02070309020205020404" pitchFamily="49" charset="0"/>
+              </a:rPr>
+              <a:t>) and the European (dd-mm-</a:t>
+            </a:r>
+            <a:r>
+              <a:rPr lang="en-US" dirty="0" err="1">
+                <a:latin typeface="+mj-lt"/>
+                <a:cs typeface="Courier New" panose="02070309020205020404" pitchFamily="49" charset="0"/>
+              </a:rPr>
+              <a:t>yyyy</a:t>
+            </a:r>
+            <a:r>
+              <a:rPr lang="en-US" dirty="0">
+                <a:latin typeface="+mj-lt"/>
+                <a:cs typeface="Courier New" panose="02070309020205020404" pitchFamily="49" charset="0"/>
+              </a:rPr>
+              <a:t>) standards.</a:t>
             </a:r>
             <a:endParaRPr lang="en-US" dirty="0">
               <a:latin typeface="+mj-lt"/>
@@ -6009,7 +6620,7 @@
               <a:pPr>
                 <a:defRPr/>
               </a:pPr>
-              <a:t>20</a:t>
+              <a:t>23</a:t>
             </a:fld>
             <a:endParaRPr lang="en-US"/>
           </a:p>
@@ -6032,7 +6643,7 @@
           <a:p>
             <a:r>
               <a:rPr lang="en-US" dirty="0"/>
-              <a:t>What have you learned today?</a:t>
+              <a:t>Importing dates</a:t>
             </a:r>
           </a:p>
         </p:txBody>
@@ -6040,7 +6651,1340 @@
     </p:spTree>
     <p:extLst>
       <p:ext uri="{BB962C8B-B14F-4D97-AF65-F5344CB8AC3E}">
-        <p14:creationId xmlns:p14="http://schemas.microsoft.com/office/powerpoint/2010/main" val="2855152681"/>
+        <p14:creationId xmlns:p14="http://schemas.microsoft.com/office/powerpoint/2010/main" val="2609970607"/>
+      </p:ext>
+    </p:extLst>
+  </p:cSld>
+  <p:clrMapOvr>
+    <a:masterClrMapping/>
+  </p:clrMapOvr>
+</p:sld>
+</file>
+
+<file path=ppt/slides/slide24.xml><?xml version="1.0" encoding="utf-8"?>
+<p:sld xmlns:a="http://schemas.openxmlformats.org/drawingml/2006/main" xmlns:r="http://schemas.openxmlformats.org/officeDocument/2006/relationships" xmlns:p="http://schemas.openxmlformats.org/presentationml/2006/main">
+  <p:cSld>
+    <p:spTree>
+      <p:nvGrpSpPr>
+        <p:cNvPr id="1" name=""/>
+        <p:cNvGrpSpPr/>
+        <p:nvPr/>
+      </p:nvGrpSpPr>
+      <p:grpSpPr>
+        <a:xfrm>
+          <a:off x="0" y="0"/>
+          <a:ext cx="0" cy="0"/>
+          <a:chOff x="0" y="0"/>
+          <a:chExt cx="0" cy="0"/>
+        </a:xfrm>
+      </p:grpSpPr>
+      <p:sp>
+        <p:nvSpPr>
+          <p:cNvPr id="2" name="Title 1"/>
+          <p:cNvSpPr>
+            <a:spLocks noGrp="1"/>
+          </p:cNvSpPr>
+          <p:nvPr>
+            <p:ph type="title"/>
+          </p:nvPr>
+        </p:nvSpPr>
+        <p:spPr/>
+        <p:txBody>
+          <a:bodyPr/>
+          <a:lstStyle/>
+          <a:p>
+            <a:r>
+              <a:rPr lang="en-US" dirty="0"/>
+              <a:t>Data management</a:t>
+            </a:r>
+          </a:p>
+        </p:txBody>
+      </p:sp>
+      <p:sp>
+        <p:nvSpPr>
+          <p:cNvPr id="3" name="Text Placeholder 2"/>
+          <p:cNvSpPr>
+            <a:spLocks noGrp="1"/>
+          </p:cNvSpPr>
+          <p:nvPr>
+            <p:ph type="body" idx="1"/>
+          </p:nvPr>
+        </p:nvSpPr>
+        <p:spPr/>
+        <p:txBody>
+          <a:bodyPr/>
+          <a:lstStyle/>
+          <a:p>
+            <a:r>
+              <a:rPr lang="en-US" dirty="0">
+                <a:latin typeface="+mj-lt"/>
+                <a:cs typeface="Courier New" panose="02070309020205020404" pitchFamily="49" charset="0"/>
+              </a:rPr>
+              <a:t>If your data imports incorrectly, </a:t>
+            </a:r>
+          </a:p>
+          <a:p>
+            <a:pPr marL="457200" indent="-457200">
+              <a:buFont typeface="+mj-lt"/>
+              <a:buAutoNum type="arabicPeriod"/>
+            </a:pPr>
+            <a:r>
+              <a:rPr lang="en-US" dirty="0">
+                <a:latin typeface="+mj-lt"/>
+                <a:cs typeface="Courier New" panose="02070309020205020404" pitchFamily="49" charset="0"/>
+              </a:rPr>
+              <a:t>check for the wrong century,</a:t>
+            </a:r>
+          </a:p>
+          <a:p>
+            <a:pPr marL="457200" indent="-457200">
+              <a:buFont typeface="+mj-lt"/>
+              <a:buAutoNum type="arabicPeriod"/>
+            </a:pPr>
+            <a:r>
+              <a:rPr lang="en-US" dirty="0">
+                <a:latin typeface="+mj-lt"/>
+                <a:cs typeface="Courier New" panose="02070309020205020404" pitchFamily="49" charset="0"/>
+              </a:rPr>
+              <a:t>check for origin problems (e.g., 1960-01-01 versus 1970-01-01),</a:t>
+            </a:r>
+          </a:p>
+          <a:p>
+            <a:pPr marL="457200" indent="-457200">
+              <a:buFont typeface="+mj-lt"/>
+              <a:buAutoNum type="arabicPeriod"/>
+            </a:pPr>
+            <a:r>
+              <a:rPr lang="en-US" dirty="0">
+                <a:latin typeface="+mj-lt"/>
+                <a:cs typeface="Courier New" panose="02070309020205020404" pitchFamily="49" charset="0"/>
+              </a:rPr>
+              <a:t>try a more rigid or structured format for the import, or</a:t>
+            </a:r>
+          </a:p>
+          <a:p>
+            <a:pPr marL="457200" indent="-457200">
+              <a:buFont typeface="+mj-lt"/>
+              <a:buAutoNum type="arabicPeriod"/>
+            </a:pPr>
+            <a:r>
+              <a:rPr lang="en-US" dirty="0">
+                <a:latin typeface="+mj-lt"/>
+                <a:cs typeface="Courier New" panose="02070309020205020404" pitchFamily="49" charset="0"/>
+              </a:rPr>
+              <a:t>fix things by hand.</a:t>
+            </a:r>
+          </a:p>
+          <a:p>
+            <a:pPr marL="914400" lvl="1" indent="-457200">
+              <a:buFont typeface="+mj-lt"/>
+              <a:buAutoNum type="arabicPeriod"/>
+            </a:pPr>
+            <a:endParaRPr lang="en-US" dirty="0">
+              <a:latin typeface="+mj-lt"/>
+              <a:cs typeface="Courier New" panose="02070309020205020404" pitchFamily="49" charset="0"/>
+            </a:endParaRPr>
+          </a:p>
+          <a:p>
+            <a:r>
+              <a:rPr lang="en-US" dirty="0">
+                <a:latin typeface="+mj-lt"/>
+                <a:cs typeface="Courier New" panose="02070309020205020404" pitchFamily="49" charset="0"/>
+              </a:rPr>
+              <a:t>Always document your choices.</a:t>
+            </a:r>
+            <a:endParaRPr lang="en-US" dirty="0">
+              <a:latin typeface="+mj-lt"/>
+            </a:endParaRPr>
+          </a:p>
+        </p:txBody>
+      </p:sp>
+      <p:sp>
+        <p:nvSpPr>
+          <p:cNvPr id="4" name="Footer Placeholder 3"/>
+          <p:cNvSpPr>
+            <a:spLocks noGrp="1"/>
+          </p:cNvSpPr>
+          <p:nvPr>
+            <p:ph type="ftr" sz="quarter" idx="10"/>
+          </p:nvPr>
+        </p:nvSpPr>
+        <p:spPr/>
+        <p:txBody>
+          <a:bodyPr/>
+          <a:lstStyle/>
+          <a:p>
+            <a:pPr>
+              <a:defRPr/>
+            </a:pPr>
+            <a:r>
+              <a:rPr lang="en-US" altLang="en-US" dirty="0"/>
+              <a:t>©2018 Steve Simon    http://TheAnalysisFactor.com</a:t>
+            </a:r>
+          </a:p>
+        </p:txBody>
+      </p:sp>
+      <p:sp>
+        <p:nvSpPr>
+          <p:cNvPr id="5" name="Slide Number Placeholder 4"/>
+          <p:cNvSpPr>
+            <a:spLocks noGrp="1"/>
+          </p:cNvSpPr>
+          <p:nvPr>
+            <p:ph type="sldNum" sz="quarter" idx="11"/>
+          </p:nvPr>
+        </p:nvSpPr>
+        <p:spPr/>
+        <p:txBody>
+          <a:bodyPr/>
+          <a:lstStyle/>
+          <a:p>
+            <a:pPr>
+              <a:defRPr/>
+            </a:pPr>
+            <a:endParaRPr lang="en-US"/>
+          </a:p>
+          <a:p>
+            <a:pPr>
+              <a:defRPr/>
+            </a:pPr>
+            <a:fld id="{E9A8CBA3-AA2B-46A6-BFA3-DCEBEAAB3F0A}" type="slidenum">
+              <a:rPr lang="en-US" smtClean="0"/>
+              <a:pPr>
+                <a:defRPr/>
+              </a:pPr>
+              <a:t>24</a:t>
+            </a:fld>
+            <a:endParaRPr lang="en-US"/>
+          </a:p>
+        </p:txBody>
+      </p:sp>
+      <p:sp>
+        <p:nvSpPr>
+          <p:cNvPr id="6" name="Text Placeholder 5"/>
+          <p:cNvSpPr>
+            <a:spLocks noGrp="1"/>
+          </p:cNvSpPr>
+          <p:nvPr>
+            <p:ph type="body" sz="quarter" idx="12"/>
+          </p:nvPr>
+        </p:nvSpPr>
+        <p:spPr/>
+        <p:txBody>
+          <a:bodyPr/>
+          <a:lstStyle/>
+          <a:p>
+            <a:r>
+              <a:rPr lang="en-US" dirty="0"/>
+              <a:t>Importing dates</a:t>
+            </a:r>
+          </a:p>
+        </p:txBody>
+      </p:sp>
+    </p:spTree>
+    <p:extLst>
+      <p:ext uri="{BB962C8B-B14F-4D97-AF65-F5344CB8AC3E}">
+        <p14:creationId xmlns:p14="http://schemas.microsoft.com/office/powerpoint/2010/main" val="3031823544"/>
+      </p:ext>
+    </p:extLst>
+  </p:cSld>
+  <p:clrMapOvr>
+    <a:masterClrMapping/>
+  </p:clrMapOvr>
+</p:sld>
+</file>
+
+<file path=ppt/slides/slide25.xml><?xml version="1.0" encoding="utf-8"?>
+<p:sld xmlns:a="http://schemas.openxmlformats.org/drawingml/2006/main" xmlns:r="http://schemas.openxmlformats.org/officeDocument/2006/relationships" xmlns:p="http://schemas.openxmlformats.org/presentationml/2006/main">
+  <p:cSld>
+    <p:spTree>
+      <p:nvGrpSpPr>
+        <p:cNvPr id="1" name=""/>
+        <p:cNvGrpSpPr/>
+        <p:nvPr/>
+      </p:nvGrpSpPr>
+      <p:grpSpPr>
+        <a:xfrm>
+          <a:off x="0" y="0"/>
+          <a:ext cx="0" cy="0"/>
+          <a:chOff x="0" y="0"/>
+          <a:chExt cx="0" cy="0"/>
+        </a:xfrm>
+      </p:grpSpPr>
+      <p:sp>
+        <p:nvSpPr>
+          <p:cNvPr id="2" name="Title 1"/>
+          <p:cNvSpPr>
+            <a:spLocks noGrp="1"/>
+          </p:cNvSpPr>
+          <p:nvPr>
+            <p:ph type="title"/>
+          </p:nvPr>
+        </p:nvSpPr>
+        <p:spPr/>
+        <p:txBody>
+          <a:bodyPr/>
+          <a:lstStyle/>
+          <a:p>
+            <a:r>
+              <a:rPr lang="en-US" dirty="0"/>
+              <a:t>Data management</a:t>
+            </a:r>
+          </a:p>
+        </p:txBody>
+      </p:sp>
+      <p:sp>
+        <p:nvSpPr>
+          <p:cNvPr id="3" name="Text Placeholder 2"/>
+          <p:cNvSpPr>
+            <a:spLocks noGrp="1"/>
+          </p:cNvSpPr>
+          <p:nvPr>
+            <p:ph type="body" idx="1"/>
+          </p:nvPr>
+        </p:nvSpPr>
+        <p:spPr/>
+        <p:txBody>
+          <a:bodyPr/>
+          <a:lstStyle/>
+          <a:p>
+            <a:r>
+              <a:rPr lang="en-US" dirty="0">
+                <a:latin typeface="+mj-lt"/>
+                <a:cs typeface="Courier New" panose="02070309020205020404" pitchFamily="49" charset="0"/>
+              </a:rPr>
+              <a:t>The computer software does not wants time intervals, not dates.</a:t>
+            </a:r>
+          </a:p>
+          <a:p>
+            <a:pPr marL="342900" indent="-342900">
+              <a:buFont typeface="Arial" panose="020B0604020202020204" pitchFamily="34" charset="0"/>
+              <a:buChar char="•"/>
+            </a:pPr>
+            <a:endParaRPr lang="en-US" dirty="0">
+              <a:latin typeface="+mj-lt"/>
+              <a:cs typeface="Courier New" panose="02070309020205020404" pitchFamily="49" charset="0"/>
+            </a:endParaRPr>
+          </a:p>
+          <a:p>
+            <a:r>
+              <a:rPr lang="en-US" dirty="0">
+                <a:latin typeface="+mj-lt"/>
+                <a:cs typeface="Courier New" panose="02070309020205020404" pitchFamily="49" charset="0"/>
+              </a:rPr>
+              <a:t>The time interval is usually just the subtraction of two dates.</a:t>
+            </a:r>
+          </a:p>
+          <a:p>
+            <a:pPr marL="342900" indent="-342900">
+              <a:buFont typeface="Arial" panose="020B0604020202020204" pitchFamily="34" charset="0"/>
+              <a:buChar char="•"/>
+            </a:pPr>
+            <a:r>
+              <a:rPr lang="en-US" dirty="0">
+                <a:latin typeface="+mj-lt"/>
+                <a:cs typeface="Courier New" panose="02070309020205020404" pitchFamily="49" charset="0"/>
+              </a:rPr>
+              <a:t>Use built-in functions if you can.</a:t>
+            </a:r>
+          </a:p>
+          <a:p>
+            <a:pPr marL="342900" indent="-342900">
+              <a:buFont typeface="Arial" panose="020B0604020202020204" pitchFamily="34" charset="0"/>
+              <a:buChar char="•"/>
+            </a:pPr>
+            <a:r>
+              <a:rPr lang="en-US" dirty="0">
+                <a:latin typeface="+mj-lt"/>
+                <a:cs typeface="Courier New" panose="02070309020205020404" pitchFamily="49" charset="0"/>
+              </a:rPr>
+              <a:t>Know your units of conversion</a:t>
+            </a:r>
+          </a:p>
+          <a:p>
+            <a:pPr marL="800100" lvl="1" indent="-342900">
+              <a:buFont typeface="Arial" panose="020B0604020202020204" pitchFamily="34" charset="0"/>
+              <a:buChar char="•"/>
+            </a:pPr>
+            <a:r>
+              <a:rPr lang="en-US" dirty="0">
+                <a:latin typeface="+mj-lt"/>
+                <a:cs typeface="Courier New" panose="02070309020205020404" pitchFamily="49" charset="0"/>
+              </a:rPr>
+              <a:t>86,400 seconds in a day,</a:t>
+            </a:r>
+          </a:p>
+          <a:p>
+            <a:pPr marL="800100" lvl="1" indent="-342900">
+              <a:buFont typeface="Arial" panose="020B0604020202020204" pitchFamily="34" charset="0"/>
+              <a:buChar char="•"/>
+            </a:pPr>
+            <a:r>
+              <a:rPr lang="en-US" dirty="0">
+                <a:latin typeface="+mj-lt"/>
+                <a:cs typeface="Courier New" panose="02070309020205020404" pitchFamily="49" charset="0"/>
+              </a:rPr>
+              <a:t>30.4375 days in a month,</a:t>
+            </a:r>
+          </a:p>
+          <a:p>
+            <a:pPr marL="800100" lvl="1" indent="-342900">
+              <a:buFont typeface="Arial" panose="020B0604020202020204" pitchFamily="34" charset="0"/>
+              <a:buChar char="•"/>
+            </a:pPr>
+            <a:r>
+              <a:rPr lang="en-US" dirty="0">
+                <a:latin typeface="+mj-lt"/>
+                <a:cs typeface="Courier New" panose="02070309020205020404" pitchFamily="49" charset="0"/>
+              </a:rPr>
+              <a:t>365.25 days in a year.</a:t>
+            </a:r>
+            <a:endParaRPr lang="en-US" dirty="0">
+              <a:latin typeface="+mj-lt"/>
+            </a:endParaRPr>
+          </a:p>
+        </p:txBody>
+      </p:sp>
+      <p:sp>
+        <p:nvSpPr>
+          <p:cNvPr id="4" name="Footer Placeholder 3"/>
+          <p:cNvSpPr>
+            <a:spLocks noGrp="1"/>
+          </p:cNvSpPr>
+          <p:nvPr>
+            <p:ph type="ftr" sz="quarter" idx="10"/>
+          </p:nvPr>
+        </p:nvSpPr>
+        <p:spPr/>
+        <p:txBody>
+          <a:bodyPr/>
+          <a:lstStyle/>
+          <a:p>
+            <a:pPr>
+              <a:defRPr/>
+            </a:pPr>
+            <a:r>
+              <a:rPr lang="en-US" altLang="en-US" dirty="0"/>
+              <a:t>©2018 Steve Simon    http://TheAnalysisFactor.com</a:t>
+            </a:r>
+          </a:p>
+        </p:txBody>
+      </p:sp>
+      <p:sp>
+        <p:nvSpPr>
+          <p:cNvPr id="5" name="Slide Number Placeholder 4"/>
+          <p:cNvSpPr>
+            <a:spLocks noGrp="1"/>
+          </p:cNvSpPr>
+          <p:nvPr>
+            <p:ph type="sldNum" sz="quarter" idx="11"/>
+          </p:nvPr>
+        </p:nvSpPr>
+        <p:spPr/>
+        <p:txBody>
+          <a:bodyPr/>
+          <a:lstStyle/>
+          <a:p>
+            <a:pPr>
+              <a:defRPr/>
+            </a:pPr>
+            <a:endParaRPr lang="en-US"/>
+          </a:p>
+          <a:p>
+            <a:pPr>
+              <a:defRPr/>
+            </a:pPr>
+            <a:fld id="{E9A8CBA3-AA2B-46A6-BFA3-DCEBEAAB3F0A}" type="slidenum">
+              <a:rPr lang="en-US" smtClean="0"/>
+              <a:pPr>
+                <a:defRPr/>
+              </a:pPr>
+              <a:t>25</a:t>
+            </a:fld>
+            <a:endParaRPr lang="en-US"/>
+          </a:p>
+        </p:txBody>
+      </p:sp>
+      <p:sp>
+        <p:nvSpPr>
+          <p:cNvPr id="6" name="Text Placeholder 5"/>
+          <p:cNvSpPr>
+            <a:spLocks noGrp="1"/>
+          </p:cNvSpPr>
+          <p:nvPr>
+            <p:ph type="body" sz="quarter" idx="12"/>
+          </p:nvPr>
+        </p:nvSpPr>
+        <p:spPr/>
+        <p:txBody>
+          <a:bodyPr/>
+          <a:lstStyle/>
+          <a:p>
+            <a:r>
+              <a:rPr lang="en-US" dirty="0"/>
+              <a:t>Manipulating dates</a:t>
+            </a:r>
+          </a:p>
+        </p:txBody>
+      </p:sp>
+    </p:spTree>
+    <p:extLst>
+      <p:ext uri="{BB962C8B-B14F-4D97-AF65-F5344CB8AC3E}">
+        <p14:creationId xmlns:p14="http://schemas.microsoft.com/office/powerpoint/2010/main" val="1205261998"/>
+      </p:ext>
+    </p:extLst>
+  </p:cSld>
+  <p:clrMapOvr>
+    <a:masterClrMapping/>
+  </p:clrMapOvr>
+</p:sld>
+</file>
+
+<file path=ppt/slides/slide26.xml><?xml version="1.0" encoding="utf-8"?>
+<p:sld xmlns:a="http://schemas.openxmlformats.org/drawingml/2006/main" xmlns:r="http://schemas.openxmlformats.org/officeDocument/2006/relationships" xmlns:p="http://schemas.openxmlformats.org/presentationml/2006/main">
+  <p:cSld>
+    <p:spTree>
+      <p:nvGrpSpPr>
+        <p:cNvPr id="1" name=""/>
+        <p:cNvGrpSpPr/>
+        <p:nvPr/>
+      </p:nvGrpSpPr>
+      <p:grpSpPr>
+        <a:xfrm>
+          <a:off x="0" y="0"/>
+          <a:ext cx="0" cy="0"/>
+          <a:chOff x="0" y="0"/>
+          <a:chExt cx="0" cy="0"/>
+        </a:xfrm>
+      </p:grpSpPr>
+      <p:sp>
+        <p:nvSpPr>
+          <p:cNvPr id="2" name="Title 1"/>
+          <p:cNvSpPr>
+            <a:spLocks noGrp="1"/>
+          </p:cNvSpPr>
+          <p:nvPr>
+            <p:ph type="title"/>
+          </p:nvPr>
+        </p:nvSpPr>
+        <p:spPr/>
+        <p:txBody>
+          <a:bodyPr/>
+          <a:lstStyle/>
+          <a:p>
+            <a:r>
+              <a:rPr lang="en-US" dirty="0"/>
+              <a:t>Data management</a:t>
+            </a:r>
+          </a:p>
+        </p:txBody>
+      </p:sp>
+      <p:sp>
+        <p:nvSpPr>
+          <p:cNvPr id="3" name="Text Placeholder 2"/>
+          <p:cNvSpPr>
+            <a:spLocks noGrp="1"/>
+          </p:cNvSpPr>
+          <p:nvPr>
+            <p:ph type="body" idx="1"/>
+          </p:nvPr>
+        </p:nvSpPr>
+        <p:spPr/>
+        <p:txBody>
+          <a:bodyPr/>
+          <a:lstStyle/>
+          <a:p>
+            <a:r>
+              <a:rPr lang="en-US" dirty="0">
+                <a:latin typeface="+mj-lt"/>
+                <a:cs typeface="Courier New" panose="02070309020205020404" pitchFamily="49" charset="0"/>
+              </a:rPr>
+              <a:t>If you are given a data set where the censoring time is given for you, great! If you have to figure out the censoring time, you need at least three dates.</a:t>
+            </a:r>
+          </a:p>
+          <a:p>
+            <a:pPr marL="457200" indent="-457200">
+              <a:buFont typeface="+mj-lt"/>
+              <a:buAutoNum type="arabicPeriod"/>
+            </a:pPr>
+            <a:r>
+              <a:rPr lang="en-US" dirty="0">
+                <a:latin typeface="+mj-lt"/>
+                <a:cs typeface="Courier New" panose="02070309020205020404" pitchFamily="49" charset="0"/>
+              </a:rPr>
+              <a:t>the date of origin,</a:t>
+            </a:r>
+          </a:p>
+          <a:p>
+            <a:pPr marL="457200" indent="-457200">
+              <a:buFont typeface="+mj-lt"/>
+              <a:buAutoNum type="arabicPeriod"/>
+            </a:pPr>
+            <a:r>
+              <a:rPr lang="en-US" dirty="0">
+                <a:latin typeface="+mj-lt"/>
+                <a:cs typeface="Courier New" panose="02070309020205020404" pitchFamily="49" charset="0"/>
+              </a:rPr>
+              <a:t>the date of the event (if it occurred),</a:t>
+            </a:r>
+          </a:p>
+          <a:p>
+            <a:pPr marL="457200" indent="-457200">
+              <a:buFont typeface="+mj-lt"/>
+              <a:buAutoNum type="arabicPeriod"/>
+            </a:pPr>
+            <a:r>
+              <a:rPr lang="en-US" dirty="0">
+                <a:latin typeface="+mj-lt"/>
+                <a:cs typeface="Courier New" panose="02070309020205020404" pitchFamily="49" charset="0"/>
+              </a:rPr>
+              <a:t>the date of last contact with the patient.</a:t>
+            </a:r>
+            <a:endParaRPr lang="en-US" dirty="0">
+              <a:latin typeface="+mj-lt"/>
+            </a:endParaRPr>
+          </a:p>
+        </p:txBody>
+      </p:sp>
+      <p:sp>
+        <p:nvSpPr>
+          <p:cNvPr id="4" name="Footer Placeholder 3"/>
+          <p:cNvSpPr>
+            <a:spLocks noGrp="1"/>
+          </p:cNvSpPr>
+          <p:nvPr>
+            <p:ph type="ftr" sz="quarter" idx="10"/>
+          </p:nvPr>
+        </p:nvSpPr>
+        <p:spPr/>
+        <p:txBody>
+          <a:bodyPr/>
+          <a:lstStyle/>
+          <a:p>
+            <a:pPr>
+              <a:defRPr/>
+            </a:pPr>
+            <a:r>
+              <a:rPr lang="en-US" altLang="en-US" dirty="0"/>
+              <a:t>©2018 Steve Simon    http://TheAnalysisFactor.com</a:t>
+            </a:r>
+          </a:p>
+        </p:txBody>
+      </p:sp>
+      <p:sp>
+        <p:nvSpPr>
+          <p:cNvPr id="5" name="Slide Number Placeholder 4"/>
+          <p:cNvSpPr>
+            <a:spLocks noGrp="1"/>
+          </p:cNvSpPr>
+          <p:nvPr>
+            <p:ph type="sldNum" sz="quarter" idx="11"/>
+          </p:nvPr>
+        </p:nvSpPr>
+        <p:spPr/>
+        <p:txBody>
+          <a:bodyPr/>
+          <a:lstStyle/>
+          <a:p>
+            <a:pPr>
+              <a:defRPr/>
+            </a:pPr>
+            <a:endParaRPr lang="en-US"/>
+          </a:p>
+          <a:p>
+            <a:pPr>
+              <a:defRPr/>
+            </a:pPr>
+            <a:fld id="{E9A8CBA3-AA2B-46A6-BFA3-DCEBEAAB3F0A}" type="slidenum">
+              <a:rPr lang="en-US" smtClean="0"/>
+              <a:pPr>
+                <a:defRPr/>
+              </a:pPr>
+              <a:t>26</a:t>
+            </a:fld>
+            <a:endParaRPr lang="en-US"/>
+          </a:p>
+        </p:txBody>
+      </p:sp>
+      <p:sp>
+        <p:nvSpPr>
+          <p:cNvPr id="6" name="Text Placeholder 5"/>
+          <p:cNvSpPr>
+            <a:spLocks noGrp="1"/>
+          </p:cNvSpPr>
+          <p:nvPr>
+            <p:ph type="body" sz="quarter" idx="12"/>
+          </p:nvPr>
+        </p:nvSpPr>
+        <p:spPr/>
+        <p:txBody>
+          <a:bodyPr/>
+          <a:lstStyle/>
+          <a:p>
+            <a:r>
+              <a:rPr lang="en-US" dirty="0"/>
+              <a:t>The three dates you need</a:t>
+            </a:r>
+          </a:p>
+        </p:txBody>
+      </p:sp>
+    </p:spTree>
+    <p:extLst>
+      <p:ext uri="{BB962C8B-B14F-4D97-AF65-F5344CB8AC3E}">
+        <p14:creationId xmlns:p14="http://schemas.microsoft.com/office/powerpoint/2010/main" val="3391433492"/>
+      </p:ext>
+    </p:extLst>
+  </p:cSld>
+  <p:clrMapOvr>
+    <a:masterClrMapping/>
+  </p:clrMapOvr>
+</p:sld>
+</file>
+
+<file path=ppt/slides/slide27.xml><?xml version="1.0" encoding="utf-8"?>
+<p:sld xmlns:a="http://schemas.openxmlformats.org/drawingml/2006/main" xmlns:r="http://schemas.openxmlformats.org/officeDocument/2006/relationships" xmlns:p="http://schemas.openxmlformats.org/presentationml/2006/main">
+  <p:cSld>
+    <p:spTree>
+      <p:nvGrpSpPr>
+        <p:cNvPr id="1" name=""/>
+        <p:cNvGrpSpPr/>
+        <p:nvPr/>
+      </p:nvGrpSpPr>
+      <p:grpSpPr>
+        <a:xfrm>
+          <a:off x="0" y="0"/>
+          <a:ext cx="0" cy="0"/>
+          <a:chOff x="0" y="0"/>
+          <a:chExt cx="0" cy="0"/>
+        </a:xfrm>
+      </p:grpSpPr>
+      <p:sp>
+        <p:nvSpPr>
+          <p:cNvPr id="2" name="Title 1"/>
+          <p:cNvSpPr>
+            <a:spLocks noGrp="1"/>
+          </p:cNvSpPr>
+          <p:nvPr>
+            <p:ph type="title"/>
+          </p:nvPr>
+        </p:nvSpPr>
+        <p:spPr/>
+        <p:txBody>
+          <a:bodyPr/>
+          <a:lstStyle/>
+          <a:p>
+            <a:r>
+              <a:rPr lang="en-US" dirty="0"/>
+              <a:t>Data management</a:t>
+            </a:r>
+          </a:p>
+        </p:txBody>
+      </p:sp>
+      <p:sp>
+        <p:nvSpPr>
+          <p:cNvPr id="3" name="Text Placeholder 2"/>
+          <p:cNvSpPr>
+            <a:spLocks noGrp="1"/>
+          </p:cNvSpPr>
+          <p:nvPr>
+            <p:ph type="body" idx="1"/>
+          </p:nvPr>
+        </p:nvSpPr>
+        <p:spPr/>
+        <p:txBody>
+          <a:bodyPr/>
+          <a:lstStyle/>
+          <a:p>
+            <a:r>
+              <a:rPr lang="en-US" dirty="0">
+                <a:latin typeface="+mj-lt"/>
+                <a:cs typeface="Courier New" panose="02070309020205020404" pitchFamily="49" charset="0"/>
+              </a:rPr>
+              <a:t>The date of origin seems like it should be easy, but it is not. It could be</a:t>
+            </a:r>
+          </a:p>
+          <a:p>
+            <a:pPr marL="457200" indent="-457200">
+              <a:buFont typeface="+mj-lt"/>
+              <a:buAutoNum type="arabicPeriod"/>
+            </a:pPr>
+            <a:r>
+              <a:rPr lang="en-US" dirty="0">
+                <a:latin typeface="+mj-lt"/>
+                <a:cs typeface="Courier New" panose="02070309020205020404" pitchFamily="49" charset="0"/>
+              </a:rPr>
+              <a:t>the date of birth,</a:t>
+            </a:r>
+          </a:p>
+          <a:p>
+            <a:pPr marL="457200" indent="-457200">
+              <a:buFont typeface="+mj-lt"/>
+              <a:buAutoNum type="arabicPeriod"/>
+            </a:pPr>
+            <a:r>
+              <a:rPr lang="en-US" dirty="0">
+                <a:latin typeface="+mj-lt"/>
+                <a:cs typeface="Courier New" panose="02070309020205020404" pitchFamily="49" charset="0"/>
+              </a:rPr>
+              <a:t>the date of diagnosis,</a:t>
+            </a:r>
+          </a:p>
+          <a:p>
+            <a:pPr marL="457200" indent="-457200">
+              <a:buFont typeface="+mj-lt"/>
+              <a:buAutoNum type="arabicPeriod"/>
+            </a:pPr>
+            <a:r>
+              <a:rPr lang="en-US" dirty="0">
+                <a:latin typeface="+mj-lt"/>
+                <a:cs typeface="Courier New" panose="02070309020205020404" pitchFamily="49" charset="0"/>
+              </a:rPr>
+              <a:t>the date of randomization,</a:t>
+            </a:r>
+          </a:p>
+          <a:p>
+            <a:pPr marL="457200" indent="-457200">
+              <a:buFont typeface="+mj-lt"/>
+              <a:buAutoNum type="arabicPeriod"/>
+            </a:pPr>
+            <a:r>
+              <a:rPr lang="en-US" dirty="0">
+                <a:latin typeface="+mj-lt"/>
+                <a:cs typeface="Courier New" panose="02070309020205020404" pitchFamily="49" charset="0"/>
+              </a:rPr>
+              <a:t>the date when therapy was first initiated.</a:t>
+            </a:r>
+          </a:p>
+        </p:txBody>
+      </p:sp>
+      <p:sp>
+        <p:nvSpPr>
+          <p:cNvPr id="4" name="Footer Placeholder 3"/>
+          <p:cNvSpPr>
+            <a:spLocks noGrp="1"/>
+          </p:cNvSpPr>
+          <p:nvPr>
+            <p:ph type="ftr" sz="quarter" idx="10"/>
+          </p:nvPr>
+        </p:nvSpPr>
+        <p:spPr/>
+        <p:txBody>
+          <a:bodyPr/>
+          <a:lstStyle/>
+          <a:p>
+            <a:pPr>
+              <a:defRPr/>
+            </a:pPr>
+            <a:r>
+              <a:rPr lang="en-US" altLang="en-US" dirty="0"/>
+              <a:t>©2018 Steve Simon    http://TheAnalysisFactor.com</a:t>
+            </a:r>
+          </a:p>
+        </p:txBody>
+      </p:sp>
+      <p:sp>
+        <p:nvSpPr>
+          <p:cNvPr id="5" name="Slide Number Placeholder 4"/>
+          <p:cNvSpPr>
+            <a:spLocks noGrp="1"/>
+          </p:cNvSpPr>
+          <p:nvPr>
+            <p:ph type="sldNum" sz="quarter" idx="11"/>
+          </p:nvPr>
+        </p:nvSpPr>
+        <p:spPr/>
+        <p:txBody>
+          <a:bodyPr/>
+          <a:lstStyle/>
+          <a:p>
+            <a:pPr>
+              <a:defRPr/>
+            </a:pPr>
+            <a:endParaRPr lang="en-US"/>
+          </a:p>
+          <a:p>
+            <a:pPr>
+              <a:defRPr/>
+            </a:pPr>
+            <a:fld id="{E9A8CBA3-AA2B-46A6-BFA3-DCEBEAAB3F0A}" type="slidenum">
+              <a:rPr lang="en-US" smtClean="0"/>
+              <a:pPr>
+                <a:defRPr/>
+              </a:pPr>
+              <a:t>27</a:t>
+            </a:fld>
+            <a:endParaRPr lang="en-US"/>
+          </a:p>
+        </p:txBody>
+      </p:sp>
+      <p:sp>
+        <p:nvSpPr>
+          <p:cNvPr id="6" name="Text Placeholder 5"/>
+          <p:cNvSpPr>
+            <a:spLocks noGrp="1"/>
+          </p:cNvSpPr>
+          <p:nvPr>
+            <p:ph type="body" sz="quarter" idx="12"/>
+          </p:nvPr>
+        </p:nvSpPr>
+        <p:spPr/>
+        <p:txBody>
+          <a:bodyPr/>
+          <a:lstStyle/>
+          <a:p>
+            <a:r>
+              <a:rPr lang="en-US" dirty="0"/>
+              <a:t>The date of origin</a:t>
+            </a:r>
+          </a:p>
+        </p:txBody>
+      </p:sp>
+    </p:spTree>
+    <p:extLst>
+      <p:ext uri="{BB962C8B-B14F-4D97-AF65-F5344CB8AC3E}">
+        <p14:creationId xmlns:p14="http://schemas.microsoft.com/office/powerpoint/2010/main" val="206383780"/>
+      </p:ext>
+    </p:extLst>
+  </p:cSld>
+  <p:clrMapOvr>
+    <a:masterClrMapping/>
+  </p:clrMapOvr>
+</p:sld>
+</file>
+
+<file path=ppt/slides/slide28.xml><?xml version="1.0" encoding="utf-8"?>
+<p:sld xmlns:a="http://schemas.openxmlformats.org/drawingml/2006/main" xmlns:r="http://schemas.openxmlformats.org/officeDocument/2006/relationships" xmlns:p="http://schemas.openxmlformats.org/presentationml/2006/main">
+  <p:cSld>
+    <p:spTree>
+      <p:nvGrpSpPr>
+        <p:cNvPr id="1" name=""/>
+        <p:cNvGrpSpPr/>
+        <p:nvPr/>
+      </p:nvGrpSpPr>
+      <p:grpSpPr>
+        <a:xfrm>
+          <a:off x="0" y="0"/>
+          <a:ext cx="0" cy="0"/>
+          <a:chOff x="0" y="0"/>
+          <a:chExt cx="0" cy="0"/>
+        </a:xfrm>
+      </p:grpSpPr>
+      <p:sp>
+        <p:nvSpPr>
+          <p:cNvPr id="2" name="Title 1"/>
+          <p:cNvSpPr>
+            <a:spLocks noGrp="1"/>
+          </p:cNvSpPr>
+          <p:nvPr>
+            <p:ph type="title"/>
+          </p:nvPr>
+        </p:nvSpPr>
+        <p:spPr/>
+        <p:txBody>
+          <a:bodyPr/>
+          <a:lstStyle/>
+          <a:p>
+            <a:r>
+              <a:rPr lang="en-US" dirty="0"/>
+              <a:t>Data management</a:t>
+            </a:r>
+          </a:p>
+        </p:txBody>
+      </p:sp>
+      <p:sp>
+        <p:nvSpPr>
+          <p:cNvPr id="3" name="Text Placeholder 2"/>
+          <p:cNvSpPr>
+            <a:spLocks noGrp="1"/>
+          </p:cNvSpPr>
+          <p:nvPr>
+            <p:ph type="body" idx="1"/>
+          </p:nvPr>
+        </p:nvSpPr>
+        <p:spPr/>
+        <p:txBody>
+          <a:bodyPr/>
+          <a:lstStyle/>
+          <a:p>
+            <a:r>
+              <a:rPr lang="en-US" dirty="0">
+                <a:latin typeface="+mj-lt"/>
+                <a:cs typeface="Courier New" panose="02070309020205020404" pitchFamily="49" charset="0"/>
+              </a:rPr>
+              <a:t>For particular events, the date of origin might change.</a:t>
+            </a:r>
+          </a:p>
+          <a:p>
+            <a:pPr marL="342900" indent="-342900">
+              <a:buFont typeface="Arial" panose="020B0604020202020204" pitchFamily="34" charset="0"/>
+              <a:buChar char="•"/>
+            </a:pPr>
+            <a:r>
+              <a:rPr lang="en-US" dirty="0">
+                <a:latin typeface="+mj-lt"/>
+                <a:cs typeface="Courier New" panose="02070309020205020404" pitchFamily="49" charset="0"/>
+              </a:rPr>
+              <a:t>Rehospitalization, use date of first discharge.</a:t>
+            </a:r>
+          </a:p>
+          <a:p>
+            <a:pPr marL="342900" indent="-342900">
+              <a:buFont typeface="Arial" panose="020B0604020202020204" pitchFamily="34" charset="0"/>
+              <a:buChar char="•"/>
+            </a:pPr>
+            <a:r>
+              <a:rPr lang="en-US" dirty="0">
+                <a:latin typeface="+mj-lt"/>
+                <a:cs typeface="Courier New" panose="02070309020205020404" pitchFamily="49" charset="0"/>
+              </a:rPr>
+              <a:t>Failure of a mechanical device, use date of implant.</a:t>
+            </a:r>
+          </a:p>
+          <a:p>
+            <a:pPr marL="342900" indent="-342900">
+              <a:buFont typeface="Arial" panose="020B0604020202020204" pitchFamily="34" charset="0"/>
+              <a:buChar char="•"/>
+            </a:pPr>
+            <a:r>
+              <a:rPr lang="en-US" dirty="0">
+                <a:latin typeface="+mj-lt"/>
+                <a:cs typeface="Courier New" panose="02070309020205020404" pitchFamily="49" charset="0"/>
+              </a:rPr>
+              <a:t>Divorce, use date of marriage.</a:t>
+            </a:r>
+          </a:p>
+          <a:p>
+            <a:pPr marL="342900" indent="-342900">
+              <a:buFont typeface="Arial" panose="020B0604020202020204" pitchFamily="34" charset="0"/>
+              <a:buChar char="•"/>
+            </a:pPr>
+            <a:r>
+              <a:rPr lang="en-US" dirty="0">
+                <a:latin typeface="+mj-lt"/>
+                <a:cs typeface="Courier New" panose="02070309020205020404" pitchFamily="49" charset="0"/>
+              </a:rPr>
+              <a:t>Loan default, use date of loan contract.</a:t>
+            </a:r>
+          </a:p>
+          <a:p>
+            <a:pPr marL="342900" indent="-342900">
+              <a:buFont typeface="Arial" panose="020B0604020202020204" pitchFamily="34" charset="0"/>
+              <a:buChar char="•"/>
+            </a:pPr>
+            <a:r>
+              <a:rPr lang="en-US" dirty="0">
+                <a:latin typeface="+mj-lt"/>
+                <a:cs typeface="Courier New" panose="02070309020205020404" pitchFamily="49" charset="0"/>
+              </a:rPr>
+              <a:t>Infectious disease, use date of first exposure.</a:t>
+            </a:r>
+          </a:p>
+          <a:p>
+            <a:pPr marL="342900" indent="-342900">
+              <a:buFont typeface="Arial" panose="020B0604020202020204" pitchFamily="34" charset="0"/>
+              <a:buChar char="•"/>
+            </a:pPr>
+            <a:endParaRPr lang="en-US" dirty="0">
+              <a:latin typeface="+mj-lt"/>
+              <a:cs typeface="Courier New" panose="02070309020205020404" pitchFamily="49" charset="0"/>
+            </a:endParaRPr>
+          </a:p>
+        </p:txBody>
+      </p:sp>
+      <p:sp>
+        <p:nvSpPr>
+          <p:cNvPr id="4" name="Footer Placeholder 3"/>
+          <p:cNvSpPr>
+            <a:spLocks noGrp="1"/>
+          </p:cNvSpPr>
+          <p:nvPr>
+            <p:ph type="ftr" sz="quarter" idx="10"/>
+          </p:nvPr>
+        </p:nvSpPr>
+        <p:spPr/>
+        <p:txBody>
+          <a:bodyPr/>
+          <a:lstStyle/>
+          <a:p>
+            <a:pPr>
+              <a:defRPr/>
+            </a:pPr>
+            <a:r>
+              <a:rPr lang="en-US" altLang="en-US" dirty="0"/>
+              <a:t>©2018 Steve Simon    http://TheAnalysisFactor.com</a:t>
+            </a:r>
+          </a:p>
+        </p:txBody>
+      </p:sp>
+      <p:sp>
+        <p:nvSpPr>
+          <p:cNvPr id="5" name="Slide Number Placeholder 4"/>
+          <p:cNvSpPr>
+            <a:spLocks noGrp="1"/>
+          </p:cNvSpPr>
+          <p:nvPr>
+            <p:ph type="sldNum" sz="quarter" idx="11"/>
+          </p:nvPr>
+        </p:nvSpPr>
+        <p:spPr/>
+        <p:txBody>
+          <a:bodyPr/>
+          <a:lstStyle/>
+          <a:p>
+            <a:pPr>
+              <a:defRPr/>
+            </a:pPr>
+            <a:endParaRPr lang="en-US"/>
+          </a:p>
+          <a:p>
+            <a:pPr>
+              <a:defRPr/>
+            </a:pPr>
+            <a:fld id="{E9A8CBA3-AA2B-46A6-BFA3-DCEBEAAB3F0A}" type="slidenum">
+              <a:rPr lang="en-US" smtClean="0"/>
+              <a:pPr>
+                <a:defRPr/>
+              </a:pPr>
+              <a:t>28</a:t>
+            </a:fld>
+            <a:endParaRPr lang="en-US"/>
+          </a:p>
+        </p:txBody>
+      </p:sp>
+      <p:sp>
+        <p:nvSpPr>
+          <p:cNvPr id="6" name="Text Placeholder 5"/>
+          <p:cNvSpPr>
+            <a:spLocks noGrp="1"/>
+          </p:cNvSpPr>
+          <p:nvPr>
+            <p:ph type="body" sz="quarter" idx="12"/>
+          </p:nvPr>
+        </p:nvSpPr>
+        <p:spPr/>
+        <p:txBody>
+          <a:bodyPr/>
+          <a:lstStyle/>
+          <a:p>
+            <a:r>
+              <a:rPr lang="en-US" dirty="0"/>
+              <a:t>The date of origin</a:t>
+            </a:r>
+          </a:p>
+        </p:txBody>
+      </p:sp>
+    </p:spTree>
+    <p:extLst>
+      <p:ext uri="{BB962C8B-B14F-4D97-AF65-F5344CB8AC3E}">
+        <p14:creationId xmlns:p14="http://schemas.microsoft.com/office/powerpoint/2010/main" val="3346854236"/>
+      </p:ext>
+    </p:extLst>
+  </p:cSld>
+  <p:clrMapOvr>
+    <a:masterClrMapping/>
+  </p:clrMapOvr>
+</p:sld>
+</file>
+
+<file path=ppt/slides/slide29.xml><?xml version="1.0" encoding="utf-8"?>
+<p:sld xmlns:a="http://schemas.openxmlformats.org/drawingml/2006/main" xmlns:r="http://schemas.openxmlformats.org/officeDocument/2006/relationships" xmlns:p="http://schemas.openxmlformats.org/presentationml/2006/main">
+  <p:cSld>
+    <p:spTree>
+      <p:nvGrpSpPr>
+        <p:cNvPr id="1" name=""/>
+        <p:cNvGrpSpPr/>
+        <p:nvPr/>
+      </p:nvGrpSpPr>
+      <p:grpSpPr>
+        <a:xfrm>
+          <a:off x="0" y="0"/>
+          <a:ext cx="0" cy="0"/>
+          <a:chOff x="0" y="0"/>
+          <a:chExt cx="0" cy="0"/>
+        </a:xfrm>
+      </p:grpSpPr>
+      <p:sp>
+        <p:nvSpPr>
+          <p:cNvPr id="2" name="Title 1"/>
+          <p:cNvSpPr>
+            <a:spLocks noGrp="1"/>
+          </p:cNvSpPr>
+          <p:nvPr>
+            <p:ph type="title"/>
+          </p:nvPr>
+        </p:nvSpPr>
+        <p:spPr/>
+        <p:txBody>
+          <a:bodyPr/>
+          <a:lstStyle/>
+          <a:p>
+            <a:r>
+              <a:rPr lang="en-US" dirty="0"/>
+              <a:t>Data management</a:t>
+            </a:r>
+          </a:p>
+        </p:txBody>
+      </p:sp>
+      <p:sp>
+        <p:nvSpPr>
+          <p:cNvPr id="3" name="Text Placeholder 2"/>
+          <p:cNvSpPr>
+            <a:spLocks noGrp="1"/>
+          </p:cNvSpPr>
+          <p:nvPr>
+            <p:ph type="body" idx="1"/>
+          </p:nvPr>
+        </p:nvSpPr>
+        <p:spPr/>
+        <p:txBody>
+          <a:bodyPr/>
+          <a:lstStyle/>
+          <a:p>
+            <a:r>
+              <a:rPr lang="en-US" dirty="0">
+                <a:latin typeface="+mj-lt"/>
+                <a:cs typeface="Courier New" panose="02070309020205020404" pitchFamily="49" charset="0"/>
+              </a:rPr>
+              <a:t>The date of the event is dependent on how you define the event.</a:t>
+            </a:r>
+          </a:p>
+          <a:p>
+            <a:pPr marL="342900" indent="-342900">
+              <a:buFont typeface="Arial" panose="020B0604020202020204" pitchFamily="34" charset="0"/>
+              <a:buChar char="•"/>
+            </a:pPr>
+            <a:r>
+              <a:rPr lang="en-US" dirty="0">
+                <a:latin typeface="+mj-lt"/>
+                <a:cs typeface="Courier New" panose="02070309020205020404" pitchFamily="49" charset="0"/>
+              </a:rPr>
+              <a:t>All-cause mortality versus mortality related to the health condition. </a:t>
+            </a:r>
+          </a:p>
+          <a:p>
+            <a:pPr marL="342900" indent="-342900">
+              <a:buFont typeface="Arial" panose="020B0604020202020204" pitchFamily="34" charset="0"/>
+              <a:buChar char="•"/>
+            </a:pPr>
+            <a:r>
+              <a:rPr lang="en-US" dirty="0">
+                <a:latin typeface="+mj-lt"/>
+                <a:cs typeface="Courier New" panose="02070309020205020404" pitchFamily="49" charset="0"/>
+              </a:rPr>
+              <a:t>Composite endpoints (death or relapse) require comparing the earlier of two dates. </a:t>
+            </a:r>
+          </a:p>
+          <a:p>
+            <a:pPr marL="342900" indent="-342900">
+              <a:buFont typeface="Arial" panose="020B0604020202020204" pitchFamily="34" charset="0"/>
+              <a:buChar char="•"/>
+            </a:pPr>
+            <a:r>
+              <a:rPr lang="en-US" dirty="0">
+                <a:latin typeface="+mj-lt"/>
+                <a:cs typeface="Courier New" panose="02070309020205020404" pitchFamily="49" charset="0"/>
+              </a:rPr>
+              <a:t>If the event did NOT happen, leave this field blank/missing. </a:t>
+            </a:r>
+          </a:p>
+          <a:p>
+            <a:pPr marL="342900" indent="-342900">
+              <a:buFont typeface="Arial" panose="020B0604020202020204" pitchFamily="34" charset="0"/>
+              <a:buChar char="•"/>
+            </a:pPr>
+            <a:endParaRPr lang="en-US" dirty="0">
+              <a:latin typeface="+mj-lt"/>
+              <a:cs typeface="Courier New" panose="02070309020205020404" pitchFamily="49" charset="0"/>
+            </a:endParaRPr>
+          </a:p>
+        </p:txBody>
+      </p:sp>
+      <p:sp>
+        <p:nvSpPr>
+          <p:cNvPr id="4" name="Footer Placeholder 3"/>
+          <p:cNvSpPr>
+            <a:spLocks noGrp="1"/>
+          </p:cNvSpPr>
+          <p:nvPr>
+            <p:ph type="ftr" sz="quarter" idx="10"/>
+          </p:nvPr>
+        </p:nvSpPr>
+        <p:spPr/>
+        <p:txBody>
+          <a:bodyPr/>
+          <a:lstStyle/>
+          <a:p>
+            <a:pPr>
+              <a:defRPr/>
+            </a:pPr>
+            <a:r>
+              <a:rPr lang="en-US" altLang="en-US" dirty="0"/>
+              <a:t>©2018 Steve Simon    http://TheAnalysisFactor.com</a:t>
+            </a:r>
+          </a:p>
+        </p:txBody>
+      </p:sp>
+      <p:sp>
+        <p:nvSpPr>
+          <p:cNvPr id="5" name="Slide Number Placeholder 4"/>
+          <p:cNvSpPr>
+            <a:spLocks noGrp="1"/>
+          </p:cNvSpPr>
+          <p:nvPr>
+            <p:ph type="sldNum" sz="quarter" idx="11"/>
+          </p:nvPr>
+        </p:nvSpPr>
+        <p:spPr/>
+        <p:txBody>
+          <a:bodyPr/>
+          <a:lstStyle/>
+          <a:p>
+            <a:pPr>
+              <a:defRPr/>
+            </a:pPr>
+            <a:endParaRPr lang="en-US"/>
+          </a:p>
+          <a:p>
+            <a:pPr>
+              <a:defRPr/>
+            </a:pPr>
+            <a:fld id="{E9A8CBA3-AA2B-46A6-BFA3-DCEBEAAB3F0A}" type="slidenum">
+              <a:rPr lang="en-US" smtClean="0"/>
+              <a:pPr>
+                <a:defRPr/>
+              </a:pPr>
+              <a:t>29</a:t>
+            </a:fld>
+            <a:endParaRPr lang="en-US"/>
+          </a:p>
+        </p:txBody>
+      </p:sp>
+      <p:sp>
+        <p:nvSpPr>
+          <p:cNvPr id="6" name="Text Placeholder 5"/>
+          <p:cNvSpPr>
+            <a:spLocks noGrp="1"/>
+          </p:cNvSpPr>
+          <p:nvPr>
+            <p:ph type="body" sz="quarter" idx="12"/>
+          </p:nvPr>
+        </p:nvSpPr>
+        <p:spPr/>
+        <p:txBody>
+          <a:bodyPr/>
+          <a:lstStyle/>
+          <a:p>
+            <a:r>
+              <a:rPr lang="en-US" dirty="0"/>
+              <a:t>The date of event</a:t>
+            </a:r>
+          </a:p>
+        </p:txBody>
+      </p:sp>
+    </p:spTree>
+    <p:extLst>
+      <p:ext uri="{BB962C8B-B14F-4D97-AF65-F5344CB8AC3E}">
+        <p14:creationId xmlns:p14="http://schemas.microsoft.com/office/powerpoint/2010/main" val="1109442857"/>
       </p:ext>
     </p:extLst>
   </p:cSld>
@@ -6196,8 +8140,13 @@
           <a:p>
             <a:r>
               <a:rPr lang="en-US" dirty="0"/>
-              <a:t>Formula for power</a:t>
-            </a:r>
+              <a:t>Formula for number </a:t>
+            </a:r>
+            <a:r>
+              <a:rPr lang="en-US"/>
+              <a:t>of deaths</a:t>
+            </a:r>
+            <a:endParaRPr lang="en-US" dirty="0"/>
           </a:p>
         </p:txBody>
       </p:sp>
@@ -6205,6 +8154,1320 @@
     <p:extLst>
       <p:ext uri="{BB962C8B-B14F-4D97-AF65-F5344CB8AC3E}">
         <p14:creationId xmlns:p14="http://schemas.microsoft.com/office/powerpoint/2010/main" val="848672673"/>
+      </p:ext>
+    </p:extLst>
+  </p:cSld>
+  <p:clrMapOvr>
+    <a:masterClrMapping/>
+  </p:clrMapOvr>
+</p:sld>
+</file>
+
+<file path=ppt/slides/slide30.xml><?xml version="1.0" encoding="utf-8"?>
+<p:sld xmlns:a="http://schemas.openxmlformats.org/drawingml/2006/main" xmlns:r="http://schemas.openxmlformats.org/officeDocument/2006/relationships" xmlns:p="http://schemas.openxmlformats.org/presentationml/2006/main">
+  <p:cSld>
+    <p:spTree>
+      <p:nvGrpSpPr>
+        <p:cNvPr id="1" name=""/>
+        <p:cNvGrpSpPr/>
+        <p:nvPr/>
+      </p:nvGrpSpPr>
+      <p:grpSpPr>
+        <a:xfrm>
+          <a:off x="0" y="0"/>
+          <a:ext cx="0" cy="0"/>
+          <a:chOff x="0" y="0"/>
+          <a:chExt cx="0" cy="0"/>
+        </a:xfrm>
+      </p:grpSpPr>
+      <p:sp>
+        <p:nvSpPr>
+          <p:cNvPr id="2" name="Title 1"/>
+          <p:cNvSpPr>
+            <a:spLocks noGrp="1"/>
+          </p:cNvSpPr>
+          <p:nvPr>
+            <p:ph type="title"/>
+          </p:nvPr>
+        </p:nvSpPr>
+        <p:spPr/>
+        <p:txBody>
+          <a:bodyPr/>
+          <a:lstStyle/>
+          <a:p>
+            <a:r>
+              <a:rPr lang="en-US" dirty="0"/>
+              <a:t>Data management</a:t>
+            </a:r>
+          </a:p>
+        </p:txBody>
+      </p:sp>
+      <p:sp>
+        <p:nvSpPr>
+          <p:cNvPr id="3" name="Text Placeholder 2"/>
+          <p:cNvSpPr>
+            <a:spLocks noGrp="1"/>
+          </p:cNvSpPr>
+          <p:nvPr>
+            <p:ph type="body" idx="1"/>
+          </p:nvPr>
+        </p:nvSpPr>
+        <p:spPr/>
+        <p:txBody>
+          <a:bodyPr/>
+          <a:lstStyle/>
+          <a:p>
+            <a:r>
+              <a:rPr lang="en-US" dirty="0">
+                <a:latin typeface="+mj-lt"/>
+                <a:cs typeface="Courier New" panose="02070309020205020404" pitchFamily="49" charset="0"/>
+              </a:rPr>
+              <a:t>Every patient will have a date of last contact. It will be the last time that you have been able to contact the patient and confirm that the event has not yet occurred.</a:t>
+            </a:r>
+          </a:p>
+          <a:p>
+            <a:endParaRPr lang="en-US" dirty="0">
+              <a:latin typeface="+mj-lt"/>
+              <a:cs typeface="Courier New" panose="02070309020205020404" pitchFamily="49" charset="0"/>
+            </a:endParaRPr>
+          </a:p>
+          <a:p>
+            <a:r>
+              <a:rPr lang="en-US" dirty="0">
+                <a:latin typeface="+mj-lt"/>
+                <a:cs typeface="Courier New" panose="02070309020205020404" pitchFamily="49" charset="0"/>
+              </a:rPr>
+              <a:t>If the event has occurred, you have several reasonable choices:</a:t>
+            </a:r>
+          </a:p>
+          <a:p>
+            <a:pPr marL="457200" indent="-457200">
+              <a:buFont typeface="+mj-lt"/>
+              <a:buAutoNum type="arabicPeriod"/>
+            </a:pPr>
+            <a:r>
+              <a:rPr lang="en-US" dirty="0">
+                <a:latin typeface="+mj-lt"/>
+                <a:cs typeface="Courier New" panose="02070309020205020404" pitchFamily="49" charset="0"/>
+              </a:rPr>
+              <a:t>put the event date in this field also,</a:t>
+            </a:r>
+          </a:p>
+          <a:p>
+            <a:pPr marL="457200" indent="-457200">
+              <a:buFont typeface="+mj-lt"/>
+              <a:buAutoNum type="arabicPeriod"/>
+            </a:pPr>
+            <a:r>
+              <a:rPr lang="en-US" dirty="0">
+                <a:latin typeface="+mj-lt"/>
+                <a:cs typeface="Courier New" panose="02070309020205020404" pitchFamily="49" charset="0"/>
+              </a:rPr>
+              <a:t>leave the field blank/missing,</a:t>
+            </a:r>
+          </a:p>
+          <a:p>
+            <a:pPr marL="457200" indent="-457200">
+              <a:buFont typeface="+mj-lt"/>
+              <a:buAutoNum type="arabicPeriod"/>
+            </a:pPr>
+            <a:r>
+              <a:rPr lang="en-US" dirty="0">
+                <a:latin typeface="+mj-lt"/>
+                <a:cs typeface="Courier New" panose="02070309020205020404" pitchFamily="49" charset="0"/>
+              </a:rPr>
+              <a:t>put the last date of contact,</a:t>
+            </a:r>
+          </a:p>
+          <a:p>
+            <a:pPr lvl="2"/>
+            <a:r>
+              <a:rPr lang="en-US" dirty="0">
+                <a:latin typeface="+mj-lt"/>
+                <a:cs typeface="Courier New" panose="02070309020205020404" pitchFamily="49" charset="0"/>
+              </a:rPr>
+              <a:t>(a date after the event date may represent a data error!)</a:t>
+            </a:r>
+          </a:p>
+        </p:txBody>
+      </p:sp>
+      <p:sp>
+        <p:nvSpPr>
+          <p:cNvPr id="4" name="Footer Placeholder 3"/>
+          <p:cNvSpPr>
+            <a:spLocks noGrp="1"/>
+          </p:cNvSpPr>
+          <p:nvPr>
+            <p:ph type="ftr" sz="quarter" idx="10"/>
+          </p:nvPr>
+        </p:nvSpPr>
+        <p:spPr/>
+        <p:txBody>
+          <a:bodyPr/>
+          <a:lstStyle/>
+          <a:p>
+            <a:pPr>
+              <a:defRPr/>
+            </a:pPr>
+            <a:r>
+              <a:rPr lang="en-US" altLang="en-US" dirty="0"/>
+              <a:t>©2018 Steve Simon    http://TheAnalysisFactor.com</a:t>
+            </a:r>
+          </a:p>
+        </p:txBody>
+      </p:sp>
+      <p:sp>
+        <p:nvSpPr>
+          <p:cNvPr id="5" name="Slide Number Placeholder 4"/>
+          <p:cNvSpPr>
+            <a:spLocks noGrp="1"/>
+          </p:cNvSpPr>
+          <p:nvPr>
+            <p:ph type="sldNum" sz="quarter" idx="11"/>
+          </p:nvPr>
+        </p:nvSpPr>
+        <p:spPr/>
+        <p:txBody>
+          <a:bodyPr/>
+          <a:lstStyle/>
+          <a:p>
+            <a:pPr>
+              <a:defRPr/>
+            </a:pPr>
+            <a:endParaRPr lang="en-US"/>
+          </a:p>
+          <a:p>
+            <a:pPr>
+              <a:defRPr/>
+            </a:pPr>
+            <a:fld id="{E9A8CBA3-AA2B-46A6-BFA3-DCEBEAAB3F0A}" type="slidenum">
+              <a:rPr lang="en-US" smtClean="0"/>
+              <a:pPr>
+                <a:defRPr/>
+              </a:pPr>
+              <a:t>30</a:t>
+            </a:fld>
+            <a:endParaRPr lang="en-US"/>
+          </a:p>
+        </p:txBody>
+      </p:sp>
+      <p:sp>
+        <p:nvSpPr>
+          <p:cNvPr id="6" name="Text Placeholder 5"/>
+          <p:cNvSpPr>
+            <a:spLocks noGrp="1"/>
+          </p:cNvSpPr>
+          <p:nvPr>
+            <p:ph type="body" sz="quarter" idx="12"/>
+          </p:nvPr>
+        </p:nvSpPr>
+        <p:spPr/>
+        <p:txBody>
+          <a:bodyPr/>
+          <a:lstStyle/>
+          <a:p>
+            <a:r>
+              <a:rPr lang="en-US" dirty="0"/>
+              <a:t>The date of last contact</a:t>
+            </a:r>
+          </a:p>
+        </p:txBody>
+      </p:sp>
+    </p:spTree>
+    <p:extLst>
+      <p:ext uri="{BB962C8B-B14F-4D97-AF65-F5344CB8AC3E}">
+        <p14:creationId xmlns:p14="http://schemas.microsoft.com/office/powerpoint/2010/main" val="1896459601"/>
+      </p:ext>
+    </p:extLst>
+  </p:cSld>
+  <p:clrMapOvr>
+    <a:masterClrMapping/>
+  </p:clrMapOvr>
+</p:sld>
+</file>
+
+<file path=ppt/slides/slide31.xml><?xml version="1.0" encoding="utf-8"?>
+<p:sld xmlns:a="http://schemas.openxmlformats.org/drawingml/2006/main" xmlns:r="http://schemas.openxmlformats.org/officeDocument/2006/relationships" xmlns:p="http://schemas.openxmlformats.org/presentationml/2006/main">
+  <p:cSld>
+    <p:spTree>
+      <p:nvGrpSpPr>
+        <p:cNvPr id="1" name=""/>
+        <p:cNvGrpSpPr/>
+        <p:nvPr/>
+      </p:nvGrpSpPr>
+      <p:grpSpPr>
+        <a:xfrm>
+          <a:off x="0" y="0"/>
+          <a:ext cx="0" cy="0"/>
+          <a:chOff x="0" y="0"/>
+          <a:chExt cx="0" cy="0"/>
+        </a:xfrm>
+      </p:grpSpPr>
+      <p:sp>
+        <p:nvSpPr>
+          <p:cNvPr id="2" name="Title 1"/>
+          <p:cNvSpPr>
+            <a:spLocks noGrp="1"/>
+          </p:cNvSpPr>
+          <p:nvPr>
+            <p:ph type="title"/>
+          </p:nvPr>
+        </p:nvSpPr>
+        <p:spPr/>
+        <p:txBody>
+          <a:bodyPr/>
+          <a:lstStyle/>
+          <a:p>
+            <a:r>
+              <a:rPr lang="en-US" dirty="0"/>
+              <a:t>Research design issues.</a:t>
+            </a:r>
+          </a:p>
+        </p:txBody>
+      </p:sp>
+      <p:sp>
+        <p:nvSpPr>
+          <p:cNvPr id="3" name="Text Placeholder 2"/>
+          <p:cNvSpPr>
+            <a:spLocks noGrp="1"/>
+          </p:cNvSpPr>
+          <p:nvPr>
+            <p:ph type="body" idx="1"/>
+          </p:nvPr>
+        </p:nvSpPr>
+        <p:spPr/>
+        <p:txBody>
+          <a:bodyPr/>
+          <a:lstStyle/>
+          <a:p>
+            <a:r>
+              <a:rPr lang="en-US" dirty="0">
+                <a:latin typeface="+mj-lt"/>
+              </a:rPr>
+              <a:t>Compared to most other studies, a prospective survival analysis</a:t>
+            </a:r>
+          </a:p>
+          <a:p>
+            <a:pPr marL="457200" indent="-457200">
+              <a:buFont typeface="+mj-lt"/>
+              <a:buAutoNum type="arabicPeriod"/>
+            </a:pPr>
+            <a:r>
+              <a:rPr lang="en-US" dirty="0">
+                <a:latin typeface="+mj-lt"/>
+              </a:rPr>
+              <a:t>takes a lot more time,</a:t>
+            </a:r>
+          </a:p>
+          <a:p>
+            <a:pPr marL="457200" indent="-457200">
+              <a:buFont typeface="+mj-lt"/>
+              <a:buAutoNum type="arabicPeriod"/>
+            </a:pPr>
+            <a:r>
+              <a:rPr lang="en-US" dirty="0">
+                <a:latin typeface="+mj-lt"/>
+              </a:rPr>
+              <a:t>requires more intensive follow-up, and</a:t>
+            </a:r>
+          </a:p>
+          <a:p>
+            <a:pPr marL="457200" indent="-457200">
+              <a:buFont typeface="+mj-lt"/>
+              <a:buAutoNum type="arabicPeriod"/>
+            </a:pPr>
+            <a:r>
+              <a:rPr lang="en-US" dirty="0">
+                <a:latin typeface="+mj-lt"/>
+              </a:rPr>
+              <a:t>suffers more from dropouts.</a:t>
+            </a:r>
+          </a:p>
+          <a:p>
+            <a:pPr marL="457200" indent="-457200">
+              <a:buFont typeface="+mj-lt"/>
+              <a:buAutoNum type="arabicPeriod"/>
+            </a:pPr>
+            <a:endParaRPr lang="en-US" dirty="0">
+              <a:latin typeface="+mj-lt"/>
+            </a:endParaRPr>
+          </a:p>
+          <a:p>
+            <a:r>
+              <a:rPr lang="en-US" dirty="0">
+                <a:latin typeface="+mj-lt"/>
+              </a:rPr>
+              <a:t>You should plan for aggressive follow-up and/or rely on outside sources to ascertain why someone dropped out of the study.</a:t>
+            </a:r>
+          </a:p>
+          <a:p>
+            <a:endParaRPr lang="en-US" dirty="0">
+              <a:latin typeface="+mj-lt"/>
+            </a:endParaRPr>
+          </a:p>
+          <a:p>
+            <a:r>
+              <a:rPr lang="en-US" dirty="0">
+                <a:latin typeface="+mj-lt"/>
+              </a:rPr>
+              <a:t>You should collect and manage data longitudinally.</a:t>
+            </a:r>
+          </a:p>
+          <a:p>
+            <a:endParaRPr lang="en-US" dirty="0">
+              <a:latin typeface="+mj-lt"/>
+            </a:endParaRPr>
+          </a:p>
+          <a:p>
+            <a:endParaRPr lang="en-US" dirty="0">
+              <a:latin typeface="+mj-lt"/>
+            </a:endParaRPr>
+          </a:p>
+        </p:txBody>
+      </p:sp>
+      <p:sp>
+        <p:nvSpPr>
+          <p:cNvPr id="4" name="Footer Placeholder 3"/>
+          <p:cNvSpPr>
+            <a:spLocks noGrp="1"/>
+          </p:cNvSpPr>
+          <p:nvPr>
+            <p:ph type="ftr" sz="quarter" idx="10"/>
+          </p:nvPr>
+        </p:nvSpPr>
+        <p:spPr/>
+        <p:txBody>
+          <a:bodyPr/>
+          <a:lstStyle/>
+          <a:p>
+            <a:pPr>
+              <a:defRPr/>
+            </a:pPr>
+            <a:r>
+              <a:rPr lang="en-US" altLang="en-US" dirty="0"/>
+              <a:t>©2018 Steve Simon    http://TheAnalysisFactor.com</a:t>
+            </a:r>
+          </a:p>
+        </p:txBody>
+      </p:sp>
+      <p:sp>
+        <p:nvSpPr>
+          <p:cNvPr id="5" name="Slide Number Placeholder 4"/>
+          <p:cNvSpPr>
+            <a:spLocks noGrp="1"/>
+          </p:cNvSpPr>
+          <p:nvPr>
+            <p:ph type="sldNum" sz="quarter" idx="11"/>
+          </p:nvPr>
+        </p:nvSpPr>
+        <p:spPr/>
+        <p:txBody>
+          <a:bodyPr/>
+          <a:lstStyle/>
+          <a:p>
+            <a:pPr>
+              <a:defRPr/>
+            </a:pPr>
+            <a:endParaRPr lang="en-US"/>
+          </a:p>
+          <a:p>
+            <a:pPr>
+              <a:defRPr/>
+            </a:pPr>
+            <a:fld id="{E9A8CBA3-AA2B-46A6-BFA3-DCEBEAAB3F0A}" type="slidenum">
+              <a:rPr lang="en-US" smtClean="0"/>
+              <a:pPr>
+                <a:defRPr/>
+              </a:pPr>
+              <a:t>31</a:t>
+            </a:fld>
+            <a:endParaRPr lang="en-US"/>
+          </a:p>
+        </p:txBody>
+      </p:sp>
+      <p:sp>
+        <p:nvSpPr>
+          <p:cNvPr id="6" name="Text Placeholder 5"/>
+          <p:cNvSpPr>
+            <a:spLocks noGrp="1"/>
+          </p:cNvSpPr>
+          <p:nvPr>
+            <p:ph type="body" sz="quarter" idx="12"/>
+          </p:nvPr>
+        </p:nvSpPr>
+        <p:spPr/>
+        <p:txBody>
+          <a:bodyPr/>
+          <a:lstStyle/>
+          <a:p>
+            <a:r>
+              <a:rPr lang="en-US" dirty="0"/>
+              <a:t>Prospective analyses</a:t>
+            </a:r>
+          </a:p>
+        </p:txBody>
+      </p:sp>
+    </p:spTree>
+    <p:extLst>
+      <p:ext uri="{BB962C8B-B14F-4D97-AF65-F5344CB8AC3E}">
+        <p14:creationId xmlns:p14="http://schemas.microsoft.com/office/powerpoint/2010/main" val="1191848172"/>
+      </p:ext>
+    </p:extLst>
+  </p:cSld>
+  <p:clrMapOvr>
+    <a:masterClrMapping/>
+  </p:clrMapOvr>
+</p:sld>
+</file>
+
+<file path=ppt/slides/slide32.xml><?xml version="1.0" encoding="utf-8"?>
+<p:sld xmlns:a="http://schemas.openxmlformats.org/drawingml/2006/main" xmlns:r="http://schemas.openxmlformats.org/officeDocument/2006/relationships" xmlns:p="http://schemas.openxmlformats.org/presentationml/2006/main">
+  <p:cSld>
+    <p:spTree>
+      <p:nvGrpSpPr>
+        <p:cNvPr id="1" name=""/>
+        <p:cNvGrpSpPr/>
+        <p:nvPr/>
+      </p:nvGrpSpPr>
+      <p:grpSpPr>
+        <a:xfrm>
+          <a:off x="0" y="0"/>
+          <a:ext cx="0" cy="0"/>
+          <a:chOff x="0" y="0"/>
+          <a:chExt cx="0" cy="0"/>
+        </a:xfrm>
+      </p:grpSpPr>
+      <p:sp>
+        <p:nvSpPr>
+          <p:cNvPr id="2" name="Title 1"/>
+          <p:cNvSpPr>
+            <a:spLocks noGrp="1"/>
+          </p:cNvSpPr>
+          <p:nvPr>
+            <p:ph type="title"/>
+          </p:nvPr>
+        </p:nvSpPr>
+        <p:spPr/>
+        <p:txBody>
+          <a:bodyPr/>
+          <a:lstStyle/>
+          <a:p>
+            <a:r>
+              <a:rPr lang="en-US" dirty="0"/>
+              <a:t>Research design issues.</a:t>
+            </a:r>
+          </a:p>
+        </p:txBody>
+      </p:sp>
+      <p:sp>
+        <p:nvSpPr>
+          <p:cNvPr id="3" name="Text Placeholder 2"/>
+          <p:cNvSpPr>
+            <a:spLocks noGrp="1"/>
+          </p:cNvSpPr>
+          <p:nvPr>
+            <p:ph type="body" idx="1"/>
+          </p:nvPr>
+        </p:nvSpPr>
+        <p:spPr/>
+        <p:txBody>
+          <a:bodyPr/>
+          <a:lstStyle/>
+          <a:p>
+            <a:r>
+              <a:rPr lang="en-US" dirty="0">
+                <a:latin typeface="+mj-lt"/>
+              </a:rPr>
+              <a:t>Interim analyses look at early stopping for</a:t>
+            </a:r>
+          </a:p>
+          <a:p>
+            <a:pPr marL="457200" indent="-457200">
+              <a:buFont typeface="+mj-lt"/>
+              <a:buAutoNum type="arabicPeriod"/>
+            </a:pPr>
+            <a:r>
+              <a:rPr lang="en-US" dirty="0">
+                <a:latin typeface="+mj-lt"/>
+              </a:rPr>
+              <a:t>vastly superior efficacy,</a:t>
+            </a:r>
+          </a:p>
+          <a:p>
+            <a:pPr marL="457200" indent="-457200">
+              <a:buFont typeface="+mj-lt"/>
+              <a:buAutoNum type="arabicPeriod"/>
+            </a:pPr>
+            <a:r>
+              <a:rPr lang="en-US" dirty="0">
+                <a:latin typeface="+mj-lt"/>
+              </a:rPr>
+              <a:t>vastly worse side effects, or</a:t>
+            </a:r>
+          </a:p>
+          <a:p>
+            <a:pPr marL="457200" indent="-457200">
+              <a:buFont typeface="+mj-lt"/>
+              <a:buAutoNum type="arabicPeriod"/>
+            </a:pPr>
+            <a:r>
+              <a:rPr lang="en-US" dirty="0">
+                <a:latin typeface="+mj-lt"/>
+              </a:rPr>
+              <a:t>futility.</a:t>
+            </a:r>
+          </a:p>
+          <a:p>
+            <a:pPr marL="457200" indent="-457200">
+              <a:buFont typeface="+mj-lt"/>
+              <a:buAutoNum type="arabicPeriod"/>
+            </a:pPr>
+            <a:endParaRPr lang="en-US" dirty="0">
+              <a:latin typeface="+mj-lt"/>
+            </a:endParaRPr>
+          </a:p>
+          <a:p>
+            <a:r>
+              <a:rPr lang="en-US" dirty="0">
+                <a:latin typeface="+mj-lt"/>
+              </a:rPr>
+              <a:t>Question: How do you handle patients with very little follow-up time at an interim analysis? </a:t>
+            </a:r>
+          </a:p>
+          <a:p>
+            <a:endParaRPr lang="en-US" dirty="0">
+              <a:latin typeface="+mj-lt"/>
+            </a:endParaRPr>
+          </a:p>
+          <a:p>
+            <a:r>
+              <a:rPr lang="en-US" dirty="0">
+                <a:latin typeface="+mj-lt"/>
+              </a:rPr>
+              <a:t>Answer: surrogate outcomes </a:t>
+            </a:r>
+          </a:p>
+          <a:p>
+            <a:pPr marL="457200" indent="-457200">
+              <a:buFont typeface="+mj-lt"/>
+              <a:buAutoNum type="arabicPeriod"/>
+            </a:pPr>
+            <a:endParaRPr lang="en-US" dirty="0">
+              <a:latin typeface="+mj-lt"/>
+            </a:endParaRPr>
+          </a:p>
+          <a:p>
+            <a:pPr marL="457200" indent="-457200">
+              <a:buFont typeface="+mj-lt"/>
+              <a:buAutoNum type="arabicPeriod"/>
+            </a:pPr>
+            <a:endParaRPr lang="en-US" dirty="0">
+              <a:latin typeface="+mj-lt"/>
+            </a:endParaRPr>
+          </a:p>
+        </p:txBody>
+      </p:sp>
+      <p:sp>
+        <p:nvSpPr>
+          <p:cNvPr id="4" name="Footer Placeholder 3"/>
+          <p:cNvSpPr>
+            <a:spLocks noGrp="1"/>
+          </p:cNvSpPr>
+          <p:nvPr>
+            <p:ph type="ftr" sz="quarter" idx="10"/>
+          </p:nvPr>
+        </p:nvSpPr>
+        <p:spPr/>
+        <p:txBody>
+          <a:bodyPr/>
+          <a:lstStyle/>
+          <a:p>
+            <a:pPr>
+              <a:defRPr/>
+            </a:pPr>
+            <a:r>
+              <a:rPr lang="en-US" altLang="en-US" dirty="0"/>
+              <a:t>©2018 Steve Simon    http://TheAnalysisFactor.com</a:t>
+            </a:r>
+          </a:p>
+        </p:txBody>
+      </p:sp>
+      <p:sp>
+        <p:nvSpPr>
+          <p:cNvPr id="5" name="Slide Number Placeholder 4"/>
+          <p:cNvSpPr>
+            <a:spLocks noGrp="1"/>
+          </p:cNvSpPr>
+          <p:nvPr>
+            <p:ph type="sldNum" sz="quarter" idx="11"/>
+          </p:nvPr>
+        </p:nvSpPr>
+        <p:spPr/>
+        <p:txBody>
+          <a:bodyPr/>
+          <a:lstStyle/>
+          <a:p>
+            <a:pPr>
+              <a:defRPr/>
+            </a:pPr>
+            <a:endParaRPr lang="en-US"/>
+          </a:p>
+          <a:p>
+            <a:pPr>
+              <a:defRPr/>
+            </a:pPr>
+            <a:fld id="{E9A8CBA3-AA2B-46A6-BFA3-DCEBEAAB3F0A}" type="slidenum">
+              <a:rPr lang="en-US" smtClean="0"/>
+              <a:pPr>
+                <a:defRPr/>
+              </a:pPr>
+              <a:t>32</a:t>
+            </a:fld>
+            <a:endParaRPr lang="en-US"/>
+          </a:p>
+        </p:txBody>
+      </p:sp>
+      <p:sp>
+        <p:nvSpPr>
+          <p:cNvPr id="6" name="Text Placeholder 5"/>
+          <p:cNvSpPr>
+            <a:spLocks noGrp="1"/>
+          </p:cNvSpPr>
+          <p:nvPr>
+            <p:ph type="body" sz="quarter" idx="12"/>
+          </p:nvPr>
+        </p:nvSpPr>
+        <p:spPr/>
+        <p:txBody>
+          <a:bodyPr/>
+          <a:lstStyle/>
+          <a:p>
+            <a:r>
+              <a:rPr lang="en-US" dirty="0"/>
+              <a:t>Interim analysis</a:t>
+            </a:r>
+          </a:p>
+        </p:txBody>
+      </p:sp>
+    </p:spTree>
+    <p:extLst>
+      <p:ext uri="{BB962C8B-B14F-4D97-AF65-F5344CB8AC3E}">
+        <p14:creationId xmlns:p14="http://schemas.microsoft.com/office/powerpoint/2010/main" val="1615181010"/>
+      </p:ext>
+    </p:extLst>
+  </p:cSld>
+  <p:clrMapOvr>
+    <a:masterClrMapping/>
+  </p:clrMapOvr>
+</p:sld>
+</file>
+
+<file path=ppt/slides/slide33.xml><?xml version="1.0" encoding="utf-8"?>
+<p:sld xmlns:a="http://schemas.openxmlformats.org/drawingml/2006/main" xmlns:r="http://schemas.openxmlformats.org/officeDocument/2006/relationships" xmlns:p="http://schemas.openxmlformats.org/presentationml/2006/main">
+  <p:cSld>
+    <p:spTree>
+      <p:nvGrpSpPr>
+        <p:cNvPr id="1" name=""/>
+        <p:cNvGrpSpPr/>
+        <p:nvPr/>
+      </p:nvGrpSpPr>
+      <p:grpSpPr>
+        <a:xfrm>
+          <a:off x="0" y="0"/>
+          <a:ext cx="0" cy="0"/>
+          <a:chOff x="0" y="0"/>
+          <a:chExt cx="0" cy="0"/>
+        </a:xfrm>
+      </p:grpSpPr>
+      <p:sp>
+        <p:nvSpPr>
+          <p:cNvPr id="2" name="Title 1"/>
+          <p:cNvSpPr>
+            <a:spLocks noGrp="1"/>
+          </p:cNvSpPr>
+          <p:nvPr>
+            <p:ph type="title"/>
+          </p:nvPr>
+        </p:nvSpPr>
+        <p:spPr/>
+        <p:txBody>
+          <a:bodyPr/>
+          <a:lstStyle/>
+          <a:p>
+            <a:r>
+              <a:rPr lang="en-US" dirty="0"/>
+              <a:t>Research design issues.</a:t>
+            </a:r>
+          </a:p>
+        </p:txBody>
+      </p:sp>
+      <p:sp>
+        <p:nvSpPr>
+          <p:cNvPr id="3" name="Text Placeholder 2"/>
+          <p:cNvSpPr>
+            <a:spLocks noGrp="1"/>
+          </p:cNvSpPr>
+          <p:nvPr>
+            <p:ph type="body" idx="1"/>
+          </p:nvPr>
+        </p:nvSpPr>
+        <p:spPr/>
+        <p:txBody>
+          <a:bodyPr/>
+          <a:lstStyle/>
+          <a:p>
+            <a:r>
+              <a:rPr lang="en-US" dirty="0">
+                <a:latin typeface="+mj-lt"/>
+              </a:rPr>
+              <a:t>Retrospective studies are almost always</a:t>
+            </a:r>
+          </a:p>
+          <a:p>
+            <a:pPr marL="342900" indent="-342900">
+              <a:buFont typeface="Arial" panose="020B0604020202020204" pitchFamily="34" charset="0"/>
+              <a:buChar char="•"/>
+            </a:pPr>
+            <a:r>
+              <a:rPr lang="en-US" dirty="0">
+                <a:latin typeface="+mj-lt"/>
+              </a:rPr>
+              <a:t>faster,</a:t>
+            </a:r>
+          </a:p>
+          <a:p>
+            <a:pPr marL="342900" indent="-342900">
+              <a:buFont typeface="Arial" panose="020B0604020202020204" pitchFamily="34" charset="0"/>
+              <a:buChar char="•"/>
+            </a:pPr>
+            <a:r>
+              <a:rPr lang="en-US" dirty="0">
+                <a:latin typeface="+mj-lt"/>
+              </a:rPr>
+              <a:t>cheaper, but</a:t>
+            </a:r>
+          </a:p>
+          <a:p>
+            <a:pPr marL="342900" indent="-342900">
+              <a:buFont typeface="Arial" panose="020B0604020202020204" pitchFamily="34" charset="0"/>
+              <a:buChar char="•"/>
+            </a:pPr>
+            <a:r>
+              <a:rPr lang="en-US" dirty="0">
+                <a:latin typeface="+mj-lt"/>
+              </a:rPr>
+              <a:t>require a longitudinal data source.</a:t>
+            </a:r>
+          </a:p>
+          <a:p>
+            <a:pPr marL="342900" indent="-342900">
+              <a:buFont typeface="Arial" panose="020B0604020202020204" pitchFamily="34" charset="0"/>
+              <a:buChar char="•"/>
+            </a:pPr>
+            <a:endParaRPr lang="en-US" dirty="0">
+              <a:latin typeface="+mj-lt"/>
+            </a:endParaRPr>
+          </a:p>
+          <a:p>
+            <a:r>
+              <a:rPr lang="en-US" dirty="0">
+                <a:latin typeface="+mj-lt"/>
+              </a:rPr>
+              <a:t>You can often supplement with data from an external sources (e.g., National Death Index).</a:t>
+            </a:r>
+          </a:p>
+        </p:txBody>
+      </p:sp>
+      <p:sp>
+        <p:nvSpPr>
+          <p:cNvPr id="4" name="Footer Placeholder 3"/>
+          <p:cNvSpPr>
+            <a:spLocks noGrp="1"/>
+          </p:cNvSpPr>
+          <p:nvPr>
+            <p:ph type="ftr" sz="quarter" idx="10"/>
+          </p:nvPr>
+        </p:nvSpPr>
+        <p:spPr/>
+        <p:txBody>
+          <a:bodyPr/>
+          <a:lstStyle/>
+          <a:p>
+            <a:pPr>
+              <a:defRPr/>
+            </a:pPr>
+            <a:r>
+              <a:rPr lang="en-US" altLang="en-US" dirty="0"/>
+              <a:t>©2018 Steve Simon    http://TheAnalysisFactor.com</a:t>
+            </a:r>
+          </a:p>
+        </p:txBody>
+      </p:sp>
+      <p:sp>
+        <p:nvSpPr>
+          <p:cNvPr id="5" name="Slide Number Placeholder 4"/>
+          <p:cNvSpPr>
+            <a:spLocks noGrp="1"/>
+          </p:cNvSpPr>
+          <p:nvPr>
+            <p:ph type="sldNum" sz="quarter" idx="11"/>
+          </p:nvPr>
+        </p:nvSpPr>
+        <p:spPr/>
+        <p:txBody>
+          <a:bodyPr/>
+          <a:lstStyle/>
+          <a:p>
+            <a:pPr>
+              <a:defRPr/>
+            </a:pPr>
+            <a:endParaRPr lang="en-US"/>
+          </a:p>
+          <a:p>
+            <a:pPr>
+              <a:defRPr/>
+            </a:pPr>
+            <a:fld id="{E9A8CBA3-AA2B-46A6-BFA3-DCEBEAAB3F0A}" type="slidenum">
+              <a:rPr lang="en-US" smtClean="0"/>
+              <a:pPr>
+                <a:defRPr/>
+              </a:pPr>
+              <a:t>33</a:t>
+            </a:fld>
+            <a:endParaRPr lang="en-US"/>
+          </a:p>
+        </p:txBody>
+      </p:sp>
+      <p:sp>
+        <p:nvSpPr>
+          <p:cNvPr id="6" name="Text Placeholder 5"/>
+          <p:cNvSpPr>
+            <a:spLocks noGrp="1"/>
+          </p:cNvSpPr>
+          <p:nvPr>
+            <p:ph type="body" sz="quarter" idx="12"/>
+          </p:nvPr>
+        </p:nvSpPr>
+        <p:spPr/>
+        <p:txBody>
+          <a:bodyPr/>
+          <a:lstStyle/>
+          <a:p>
+            <a:r>
+              <a:rPr lang="en-US" dirty="0"/>
+              <a:t>Retrospective analyses</a:t>
+            </a:r>
+          </a:p>
+        </p:txBody>
+      </p:sp>
+    </p:spTree>
+    <p:extLst>
+      <p:ext uri="{BB962C8B-B14F-4D97-AF65-F5344CB8AC3E}">
+        <p14:creationId xmlns:p14="http://schemas.microsoft.com/office/powerpoint/2010/main" val="3414575709"/>
+      </p:ext>
+    </p:extLst>
+  </p:cSld>
+  <p:clrMapOvr>
+    <a:masterClrMapping/>
+  </p:clrMapOvr>
+</p:sld>
+</file>
+
+<file path=ppt/slides/slide34.xml><?xml version="1.0" encoding="utf-8"?>
+<p:sld xmlns:a="http://schemas.openxmlformats.org/drawingml/2006/main" xmlns:r="http://schemas.openxmlformats.org/officeDocument/2006/relationships" xmlns:p="http://schemas.openxmlformats.org/presentationml/2006/main">
+  <p:cSld>
+    <p:spTree>
+      <p:nvGrpSpPr>
+        <p:cNvPr id="1" name=""/>
+        <p:cNvGrpSpPr/>
+        <p:nvPr/>
+      </p:nvGrpSpPr>
+      <p:grpSpPr>
+        <a:xfrm>
+          <a:off x="0" y="0"/>
+          <a:ext cx="0" cy="0"/>
+          <a:chOff x="0" y="0"/>
+          <a:chExt cx="0" cy="0"/>
+        </a:xfrm>
+      </p:grpSpPr>
+      <p:sp>
+        <p:nvSpPr>
+          <p:cNvPr id="2" name="Title 1"/>
+          <p:cNvSpPr>
+            <a:spLocks noGrp="1"/>
+          </p:cNvSpPr>
+          <p:nvPr>
+            <p:ph type="title"/>
+          </p:nvPr>
+        </p:nvSpPr>
+        <p:spPr/>
+        <p:txBody>
+          <a:bodyPr/>
+          <a:lstStyle/>
+          <a:p>
+            <a:r>
+              <a:rPr lang="en-US" dirty="0"/>
+              <a:t>Research design issues.</a:t>
+            </a:r>
+          </a:p>
+        </p:txBody>
+      </p:sp>
+      <p:sp>
+        <p:nvSpPr>
+          <p:cNvPr id="3" name="Text Placeholder 2"/>
+          <p:cNvSpPr>
+            <a:spLocks noGrp="1"/>
+          </p:cNvSpPr>
+          <p:nvPr>
+            <p:ph type="body" idx="1"/>
+          </p:nvPr>
+        </p:nvSpPr>
+        <p:spPr/>
+        <p:txBody>
+          <a:bodyPr/>
+          <a:lstStyle/>
+          <a:p>
+            <a:r>
+              <a:rPr lang="en-US" dirty="0">
+                <a:latin typeface="+mj-lt"/>
+              </a:rPr>
+              <a:t>Intention to treat analysis (ITT) provides special handling of patients who</a:t>
+            </a:r>
+          </a:p>
+          <a:p>
+            <a:pPr marL="457200" indent="-457200">
+              <a:buFont typeface="+mj-lt"/>
+              <a:buAutoNum type="arabicPeriod"/>
+            </a:pPr>
+            <a:r>
+              <a:rPr lang="en-US" dirty="0">
+                <a:latin typeface="+mj-lt"/>
+              </a:rPr>
+              <a:t>discontinue the assigned therapy, or </a:t>
+            </a:r>
+          </a:p>
+          <a:p>
+            <a:pPr marL="457200" indent="-457200">
+              <a:buFont typeface="+mj-lt"/>
+              <a:buAutoNum type="arabicPeriod"/>
+            </a:pPr>
+            <a:r>
+              <a:rPr lang="en-US" dirty="0">
+                <a:latin typeface="+mj-lt"/>
+              </a:rPr>
+              <a:t>switch to the competing therapy.</a:t>
+            </a:r>
+          </a:p>
+          <a:p>
+            <a:pPr marL="457200" indent="-457200">
+              <a:buFont typeface="+mj-lt"/>
+              <a:buAutoNum type="arabicPeriod"/>
+            </a:pPr>
+            <a:endParaRPr lang="en-US" dirty="0">
+              <a:latin typeface="+mj-lt"/>
+            </a:endParaRPr>
+          </a:p>
+          <a:p>
+            <a:r>
+              <a:rPr lang="en-US" dirty="0">
+                <a:latin typeface="+mj-lt"/>
+              </a:rPr>
+              <a:t>Survival analysis with time-varying covariates provides an interesting alternative to ITT.</a:t>
+            </a:r>
+          </a:p>
+        </p:txBody>
+      </p:sp>
+      <p:sp>
+        <p:nvSpPr>
+          <p:cNvPr id="4" name="Footer Placeholder 3"/>
+          <p:cNvSpPr>
+            <a:spLocks noGrp="1"/>
+          </p:cNvSpPr>
+          <p:nvPr>
+            <p:ph type="ftr" sz="quarter" idx="10"/>
+          </p:nvPr>
+        </p:nvSpPr>
+        <p:spPr/>
+        <p:txBody>
+          <a:bodyPr/>
+          <a:lstStyle/>
+          <a:p>
+            <a:pPr>
+              <a:defRPr/>
+            </a:pPr>
+            <a:r>
+              <a:rPr lang="en-US" altLang="en-US" dirty="0"/>
+              <a:t>©2018 Steve Simon    http://TheAnalysisFactor.com</a:t>
+            </a:r>
+          </a:p>
+        </p:txBody>
+      </p:sp>
+      <p:sp>
+        <p:nvSpPr>
+          <p:cNvPr id="5" name="Slide Number Placeholder 4"/>
+          <p:cNvSpPr>
+            <a:spLocks noGrp="1"/>
+          </p:cNvSpPr>
+          <p:nvPr>
+            <p:ph type="sldNum" sz="quarter" idx="11"/>
+          </p:nvPr>
+        </p:nvSpPr>
+        <p:spPr/>
+        <p:txBody>
+          <a:bodyPr/>
+          <a:lstStyle/>
+          <a:p>
+            <a:pPr>
+              <a:defRPr/>
+            </a:pPr>
+            <a:endParaRPr lang="en-US"/>
+          </a:p>
+          <a:p>
+            <a:pPr>
+              <a:defRPr/>
+            </a:pPr>
+            <a:fld id="{E9A8CBA3-AA2B-46A6-BFA3-DCEBEAAB3F0A}" type="slidenum">
+              <a:rPr lang="en-US" smtClean="0"/>
+              <a:pPr>
+                <a:defRPr/>
+              </a:pPr>
+              <a:t>34</a:t>
+            </a:fld>
+            <a:endParaRPr lang="en-US"/>
+          </a:p>
+        </p:txBody>
+      </p:sp>
+      <p:sp>
+        <p:nvSpPr>
+          <p:cNvPr id="6" name="Text Placeholder 5"/>
+          <p:cNvSpPr>
+            <a:spLocks noGrp="1"/>
+          </p:cNvSpPr>
+          <p:nvPr>
+            <p:ph type="body" sz="quarter" idx="12"/>
+          </p:nvPr>
+        </p:nvSpPr>
+        <p:spPr/>
+        <p:txBody>
+          <a:bodyPr/>
+          <a:lstStyle/>
+          <a:p>
+            <a:r>
+              <a:rPr lang="en-US" dirty="0"/>
+              <a:t>Survival analysis is an alternative to “intention to treat”</a:t>
+            </a:r>
+          </a:p>
+        </p:txBody>
+      </p:sp>
+    </p:spTree>
+    <p:extLst>
+      <p:ext uri="{BB962C8B-B14F-4D97-AF65-F5344CB8AC3E}">
+        <p14:creationId xmlns:p14="http://schemas.microsoft.com/office/powerpoint/2010/main" val="2616274426"/>
+      </p:ext>
+    </p:extLst>
+  </p:cSld>
+  <p:clrMapOvr>
+    <a:masterClrMapping/>
+  </p:clrMapOvr>
+</p:sld>
+</file>
+
+<file path=ppt/slides/slide35.xml><?xml version="1.0" encoding="utf-8"?>
+<p:sld xmlns:a="http://schemas.openxmlformats.org/drawingml/2006/main" xmlns:r="http://schemas.openxmlformats.org/officeDocument/2006/relationships" xmlns:p="http://schemas.openxmlformats.org/presentationml/2006/main">
+  <p:cSld>
+    <p:spTree>
+      <p:nvGrpSpPr>
+        <p:cNvPr id="1" name=""/>
+        <p:cNvGrpSpPr/>
+        <p:nvPr/>
+      </p:nvGrpSpPr>
+      <p:grpSpPr>
+        <a:xfrm>
+          <a:off x="0" y="0"/>
+          <a:ext cx="0" cy="0"/>
+          <a:chOff x="0" y="0"/>
+          <a:chExt cx="0" cy="0"/>
+        </a:xfrm>
+      </p:grpSpPr>
+      <p:sp>
+        <p:nvSpPr>
+          <p:cNvPr id="2" name="Title 1"/>
+          <p:cNvSpPr>
+            <a:spLocks noGrp="1"/>
+          </p:cNvSpPr>
+          <p:nvPr>
+            <p:ph type="title"/>
+          </p:nvPr>
+        </p:nvSpPr>
+        <p:spPr/>
+        <p:txBody>
+          <a:bodyPr/>
+          <a:lstStyle/>
+          <a:p>
+            <a:r>
+              <a:rPr lang="en-US" dirty="0"/>
+              <a:t>Conclusion</a:t>
+            </a:r>
+          </a:p>
+        </p:txBody>
+      </p:sp>
+      <p:sp>
+        <p:nvSpPr>
+          <p:cNvPr id="3" name="Text Placeholder 2"/>
+          <p:cNvSpPr>
+            <a:spLocks noGrp="1"/>
+          </p:cNvSpPr>
+          <p:nvPr>
+            <p:ph type="body" idx="1"/>
+          </p:nvPr>
+        </p:nvSpPr>
+        <p:spPr/>
+        <p:txBody>
+          <a:bodyPr/>
+          <a:lstStyle/>
+          <a:p>
+            <a:pPr marL="457200" indent="-457200">
+              <a:buFont typeface="+mj-lt"/>
+              <a:buAutoNum type="arabicPeriod"/>
+            </a:pPr>
+            <a:r>
+              <a:rPr lang="en-US" dirty="0">
+                <a:latin typeface="+mj-lt"/>
+                <a:cs typeface="Courier New" panose="02070309020205020404" pitchFamily="49" charset="0"/>
+              </a:rPr>
+              <a:t>The initial sample size calculations are in terms of the number of events. </a:t>
+            </a:r>
+          </a:p>
+          <a:p>
+            <a:pPr marL="457200" indent="-457200">
+              <a:buFont typeface="+mj-lt"/>
+              <a:buAutoNum type="arabicPeriod"/>
+            </a:pPr>
+            <a:r>
+              <a:rPr lang="en-US" dirty="0">
+                <a:latin typeface="+mj-lt"/>
+                <a:cs typeface="Courier New" panose="02070309020205020404" pitchFamily="49" charset="0"/>
+              </a:rPr>
+              <a:t>You have to extrapolate with parametric assumptions to get the number of patients and the required follow-up time. </a:t>
+            </a:r>
+          </a:p>
+          <a:p>
+            <a:pPr marL="457200" indent="-457200">
+              <a:buFont typeface="+mj-lt"/>
+              <a:buAutoNum type="arabicPeriod"/>
+            </a:pPr>
+            <a:r>
+              <a:rPr lang="en-US" dirty="0">
+                <a:latin typeface="+mj-lt"/>
+                <a:cs typeface="Courier New" panose="02070309020205020404" pitchFamily="49" charset="0"/>
+              </a:rPr>
+              <a:t>Data management requires special attention to dates. </a:t>
+            </a:r>
+          </a:p>
+          <a:p>
+            <a:pPr marL="457200" indent="-457200">
+              <a:buFont typeface="+mj-lt"/>
+              <a:buAutoNum type="arabicPeriod"/>
+            </a:pPr>
+            <a:r>
+              <a:rPr lang="en-US" dirty="0">
+                <a:latin typeface="+mj-lt"/>
+                <a:cs typeface="Courier New" panose="02070309020205020404" pitchFamily="49" charset="0"/>
+              </a:rPr>
+              <a:t>Survival models raises difficult, but interesting research design issues.</a:t>
+            </a:r>
+            <a:endParaRPr lang="en-US" dirty="0">
+              <a:latin typeface="+mj-lt"/>
+            </a:endParaRPr>
+          </a:p>
+        </p:txBody>
+      </p:sp>
+      <p:sp>
+        <p:nvSpPr>
+          <p:cNvPr id="4" name="Footer Placeholder 3"/>
+          <p:cNvSpPr>
+            <a:spLocks noGrp="1"/>
+          </p:cNvSpPr>
+          <p:nvPr>
+            <p:ph type="ftr" sz="quarter" idx="10"/>
+          </p:nvPr>
+        </p:nvSpPr>
+        <p:spPr/>
+        <p:txBody>
+          <a:bodyPr/>
+          <a:lstStyle/>
+          <a:p>
+            <a:pPr>
+              <a:defRPr/>
+            </a:pPr>
+            <a:r>
+              <a:rPr lang="en-US" altLang="en-US" dirty="0"/>
+              <a:t>©2018 Steve Simon    http://TheAnalysisFactor.com</a:t>
+            </a:r>
+          </a:p>
+        </p:txBody>
+      </p:sp>
+      <p:sp>
+        <p:nvSpPr>
+          <p:cNvPr id="5" name="Slide Number Placeholder 4"/>
+          <p:cNvSpPr>
+            <a:spLocks noGrp="1"/>
+          </p:cNvSpPr>
+          <p:nvPr>
+            <p:ph type="sldNum" sz="quarter" idx="11"/>
+          </p:nvPr>
+        </p:nvSpPr>
+        <p:spPr/>
+        <p:txBody>
+          <a:bodyPr/>
+          <a:lstStyle/>
+          <a:p>
+            <a:pPr>
+              <a:defRPr/>
+            </a:pPr>
+            <a:endParaRPr lang="en-US"/>
+          </a:p>
+          <a:p>
+            <a:pPr>
+              <a:defRPr/>
+            </a:pPr>
+            <a:fld id="{E9A8CBA3-AA2B-46A6-BFA3-DCEBEAAB3F0A}" type="slidenum">
+              <a:rPr lang="en-US" smtClean="0"/>
+              <a:pPr>
+                <a:defRPr/>
+              </a:pPr>
+              <a:t>35</a:t>
+            </a:fld>
+            <a:endParaRPr lang="en-US"/>
+          </a:p>
+        </p:txBody>
+      </p:sp>
+      <p:sp>
+        <p:nvSpPr>
+          <p:cNvPr id="6" name="Text Placeholder 5"/>
+          <p:cNvSpPr>
+            <a:spLocks noGrp="1"/>
+          </p:cNvSpPr>
+          <p:nvPr>
+            <p:ph type="body" sz="quarter" idx="12"/>
+          </p:nvPr>
+        </p:nvSpPr>
+        <p:spPr/>
+        <p:txBody>
+          <a:bodyPr/>
+          <a:lstStyle/>
+          <a:p>
+            <a:r>
+              <a:rPr lang="en-US" dirty="0"/>
+              <a:t>What have you learned today?</a:t>
+            </a:r>
+          </a:p>
+        </p:txBody>
+      </p:sp>
+    </p:spTree>
+    <p:extLst>
+      <p:ext uri="{BB962C8B-B14F-4D97-AF65-F5344CB8AC3E}">
+        <p14:creationId xmlns:p14="http://schemas.microsoft.com/office/powerpoint/2010/main" val="1691035053"/>
       </p:ext>
     </p:extLst>
   </p:cSld>
@@ -6829,10 +10092,10 @@
       </p:sp>
       <p:pic>
         <p:nvPicPr>
-          <p:cNvPr id="10" name="Picture 9">
+          <p:cNvPr id="7" name="Picture 6">
             <a:extLst>
               <a:ext uri="{FF2B5EF4-FFF2-40B4-BE49-F238E27FC236}">
-                <a16:creationId xmlns:a16="http://schemas.microsoft.com/office/drawing/2014/main" id="{7C9005FB-FCB5-4B22-8FE0-72D65E60B464}"/>
+                <a16:creationId xmlns:a16="http://schemas.microsoft.com/office/drawing/2014/main" id="{1AB2AD70-0404-4CB9-95E5-8BD379CD9231}"/>
               </a:ext>
             </a:extLst>
           </p:cNvPr>
@@ -6849,8 +10112,8 @@
         </p:blipFill>
         <p:spPr>
           <a:xfrm>
-            <a:off x="457200" y="2438400"/>
-            <a:ext cx="7724775" cy="2924175"/>
+            <a:off x="457200" y="2444750"/>
+            <a:ext cx="7991475" cy="3486150"/>
           </a:xfrm>
           <a:prstGeom prst="rect">
             <a:avLst/>
@@ -6860,7 +10123,7 @@
     </p:spTree>
     <p:extLst>
       <p:ext uri="{BB962C8B-B14F-4D97-AF65-F5344CB8AC3E}">
-        <p14:creationId xmlns:p14="http://schemas.microsoft.com/office/powerpoint/2010/main" val="2349930786"/>
+        <p14:creationId xmlns:p14="http://schemas.microsoft.com/office/powerpoint/2010/main" val="1618383042"/>
       </p:ext>
     </p:extLst>
   </p:cSld>
@@ -6993,10 +10256,10 @@
       </p:sp>
       <p:pic>
         <p:nvPicPr>
-          <p:cNvPr id="3" name="Picture 2">
+          <p:cNvPr id="7" name="Picture 6">
             <a:extLst>
               <a:ext uri="{FF2B5EF4-FFF2-40B4-BE49-F238E27FC236}">
-                <a16:creationId xmlns:a16="http://schemas.microsoft.com/office/drawing/2014/main" id="{BC47B82E-B9C8-4DFB-907C-ACA8B5781F4D}"/>
+                <a16:creationId xmlns:a16="http://schemas.microsoft.com/office/drawing/2014/main" id="{ED8642B1-429A-4DE2-ABB2-0B81A2287C53}"/>
               </a:ext>
             </a:extLst>
           </p:cNvPr>
@@ -7013,8 +10276,8 @@
         </p:blipFill>
         <p:spPr>
           <a:xfrm>
-            <a:off x="476250" y="2362200"/>
-            <a:ext cx="7658100" cy="3419475"/>
+            <a:off x="448235" y="2273300"/>
+            <a:ext cx="8220075" cy="3829050"/>
           </a:xfrm>
           <a:prstGeom prst="rect">
             <a:avLst/>
@@ -7024,7 +10287,7 @@
     </p:spTree>
     <p:extLst>
       <p:ext uri="{BB962C8B-B14F-4D97-AF65-F5344CB8AC3E}">
-        <p14:creationId xmlns:p14="http://schemas.microsoft.com/office/powerpoint/2010/main" val="1618383042"/>
+        <p14:creationId xmlns:p14="http://schemas.microsoft.com/office/powerpoint/2010/main" val="2349930786"/>
       </p:ext>
     </p:extLst>
   </p:cSld>
@@ -7093,7 +10356,46 @@
                 <a:latin typeface="+mj-lt"/>
                 <a:cs typeface="Courier New" panose="02070309020205020404" pitchFamily="49" charset="0"/>
               </a:rPr>
-              <a:t>Many researchers consider a formula for sample size to be inadequate. The reasons include</a:t>
+              <a:t>The hazard ratio is difficult to interpret for two reasons:</a:t>
+            </a:r>
+          </a:p>
+          <a:p>
+            <a:pPr marL="457200" indent="-457200">
+              <a:buFont typeface="+mj-lt"/>
+              <a:buAutoNum type="arabicPeriod"/>
+            </a:pPr>
+            <a:r>
+              <a:rPr lang="en-US" dirty="0">
+                <a:latin typeface="+mj-lt"/>
+                <a:cs typeface="Courier New" panose="02070309020205020404" pitchFamily="49" charset="0"/>
+              </a:rPr>
+              <a:t>It is a unitless quantity.</a:t>
+            </a:r>
+          </a:p>
+          <a:p>
+            <a:pPr marL="457200" indent="-457200">
+              <a:buFont typeface="+mj-lt"/>
+              <a:buAutoNum type="arabicPeriod"/>
+            </a:pPr>
+            <a:r>
+              <a:rPr lang="en-US" dirty="0">
+                <a:latin typeface="+mj-lt"/>
+                <a:cs typeface="Courier New" panose="02070309020205020404" pitchFamily="49" charset="0"/>
+              </a:rPr>
+              <a:t>It is a relative measure.</a:t>
+            </a:r>
+          </a:p>
+          <a:p>
+            <a:pPr marL="457200" indent="-457200">
+              <a:buFont typeface="+mj-lt"/>
+              <a:buAutoNum type="arabicPeriod"/>
+            </a:pPr>
+            <a:r>
+              <a:rPr lang="en-US" dirty="0">
+                <a:latin typeface="+mj-lt"/>
+                <a:cs typeface="Courier New" panose="02070309020205020404" pitchFamily="49" charset="0"/>
+              </a:rPr>
+              <a:t>It involves rates rather than probabilities.</a:t>
             </a:r>
           </a:p>
           <a:p>
@@ -7103,57 +10405,12 @@
             </a:endParaRPr>
           </a:p>
           <a:p>
-            <a:pPr marL="457200" indent="-457200">
-              <a:buFont typeface="+mj-lt"/>
-              <a:buAutoNum type="arabicPeriod"/>
-            </a:pPr>
             <a:r>
               <a:rPr lang="en-US" dirty="0">
                 <a:latin typeface="+mj-lt"/>
                 <a:cs typeface="Courier New" panose="02070309020205020404" pitchFamily="49" charset="0"/>
               </a:rPr>
-              <a:t>The simplistic adjustments for censoring and dropouts.</a:t>
-            </a:r>
-          </a:p>
-          <a:p>
-            <a:pPr marL="457200" indent="-457200">
-              <a:buFont typeface="+mj-lt"/>
-              <a:buAutoNum type="arabicPeriod"/>
-            </a:pPr>
-            <a:r>
-              <a:rPr lang="en-US" dirty="0">
-                <a:latin typeface="+mj-lt"/>
-                <a:cs typeface="Courier New" panose="02070309020205020404" pitchFamily="49" charset="0"/>
-              </a:rPr>
-              <a:t>The tendency for the sample size and power formulas to become unwieldy for even minor complications.</a:t>
-            </a:r>
-          </a:p>
-          <a:p>
-            <a:pPr marL="457200" indent="-457200">
-              <a:buFont typeface="+mj-lt"/>
-              <a:buAutoNum type="arabicPeriod"/>
-            </a:pPr>
-            <a:r>
-              <a:rPr lang="en-US" dirty="0">
-                <a:latin typeface="+mj-lt"/>
-                <a:cs typeface="Courier New" panose="02070309020205020404" pitchFamily="49" charset="0"/>
-              </a:rPr>
-              <a:t>The inability to examine the sensitivity of your assumptions.</a:t>
-            </a:r>
-          </a:p>
-          <a:p>
-            <a:endParaRPr lang="en-US" dirty="0">
-              <a:latin typeface="+mj-lt"/>
-              <a:cs typeface="Courier New" panose="02070309020205020404" pitchFamily="49" charset="0"/>
-            </a:endParaRPr>
-          </a:p>
-          <a:p>
-            <a:r>
-              <a:rPr lang="en-US" dirty="0">
-                <a:latin typeface="+mj-lt"/>
-                <a:cs typeface="Courier New" panose="02070309020205020404" pitchFamily="49" charset="0"/>
-              </a:rPr>
-              <a:t>Simulation of power is fairly easy and very flexible.</a:t>
+              <a:t>You should see how a hazard ratio of 2.0 changes the median survival or the probability that you survive beyond a target time point.</a:t>
             </a:r>
           </a:p>
         </p:txBody>
@@ -7235,7 +10492,7 @@
           <a:p>
             <a:r>
               <a:rPr lang="en-US" dirty="0"/>
-              <a:t>Simulation of power</a:t>
+              <a:t>What does a hazard ratio of 2.0 really mean?</a:t>
             </a:r>
           </a:p>
         </p:txBody>

</xml_diff>